<commit_message>
Added slides about ansible and terraform
• Added slides about ansible and terraform
• Fixed some typos
</commit_message>
<xml_diff>
--- a/docs/Slaidi.2022.07.04_v2.pptx
+++ b/docs/Slaidi.2022.07.04_v2.pptx
@@ -26,6 +26,15 @@
     <p:sldId id="266" r:id="rId19"/>
     <p:sldId id="267" r:id="rId20"/>
     <p:sldId id="268" r:id="rId21"/>
+    <p:sldId id="269" r:id="rId22"/>
+    <p:sldId id="270" r:id="rId23"/>
+    <p:sldId id="271" r:id="rId24"/>
+    <p:sldId id="272" r:id="rId25"/>
+    <p:sldId id="273" r:id="rId26"/>
+    <p:sldId id="274" r:id="rId27"/>
+    <p:sldId id="275" r:id="rId28"/>
+    <p:sldId id="276" r:id="rId29"/>
+    <p:sldId id="277" r:id="rId30"/>
   </p:sldIdLst>
   <p:sldSz cx="12192000" cy="6858000"/>
   <p:notesSz cx="6858000" cy="9144000"/>
@@ -286,7 +295,7 @@
             <a:pPr algn="r">
               <a:buNone/>
             </a:pPr>
-            <a:fld id="{81CC6397-2648-4BDD-B341-68B10851B0CC}" type="slidenum">
+            <a:fld id="{71F5DD7E-1ADD-491D-BDF5-99FC8C96402D}" type="slidenum">
               <a:rPr b="0" lang="lv-LV" sz="1400" spc="-1" strike="noStrike">
                 <a:latin typeface="Times New Roman"/>
               </a:rPr>
@@ -323,7 +332,7 @@
       </p:grpSpPr>
       <p:sp>
         <p:nvSpPr>
-          <p:cNvPr id="277" name="PlaceHolder 1"/>
+          <p:cNvPr id="313" name="PlaceHolder 1"/>
           <p:cNvSpPr>
             <a:spLocks noGrp="1"/>
           </p:cNvSpPr>
@@ -334,7 +343,7 @@
         <p:spPr>
           <a:xfrm>
             <a:off x="685800" y="1143000"/>
-            <a:ext cx="5485680" cy="3085560"/>
+            <a:ext cx="5484960" cy="3084840"/>
           </a:xfrm>
           <a:prstGeom prst="rect">
             <a:avLst/>
@@ -346,7 +355,7 @@
       </p:sp>
       <p:sp>
         <p:nvSpPr>
-          <p:cNvPr id="278" name="PlaceHolder 2"/>
+          <p:cNvPr id="314" name="PlaceHolder 2"/>
           <p:cNvSpPr>
             <a:spLocks noGrp="1"/>
           </p:cNvSpPr>
@@ -357,7 +366,7 @@
         <p:spPr>
           <a:xfrm>
             <a:off x="685800" y="4400640"/>
-            <a:ext cx="5485680" cy="3599640"/>
+            <a:ext cx="5484960" cy="3598920"/>
           </a:xfrm>
           <a:prstGeom prst="rect">
             <a:avLst/>
@@ -417,7 +426,7 @@
       </p:sp>
       <p:sp>
         <p:nvSpPr>
-          <p:cNvPr id="279" name="PlaceHolder 3"/>
+          <p:cNvPr id="315" name="PlaceHolder 3"/>
           <p:cNvSpPr>
             <a:spLocks noGrp="1"/>
           </p:cNvSpPr>
@@ -428,7 +437,7 @@
         <p:spPr>
           <a:xfrm>
             <a:off x="3884760" y="8685360"/>
-            <a:ext cx="2971080" cy="457920"/>
+            <a:ext cx="2970360" cy="457200"/>
           </a:xfrm>
           <a:prstGeom prst="rect">
             <a:avLst/>
@@ -449,11 +458,11 @@
               </a:lnSpc>
               <a:buNone/>
             </a:pPr>
-            <a:fld id="{AA38961B-FEA6-4253-B675-4F88243A92A1}" type="slidenum">
+            <a:fld id="{8E3EEAC3-DD86-46A0-B9E8-4B41B5B152D9}" type="slidenum">
               <a:rPr b="0" lang="lv-LV" sz="1200" spc="-1" strike="noStrike">
                 <a:latin typeface="Times New Roman"/>
               </a:rPr>
-              <a:t>8</a:t>
+              <a:t>&lt;skaitlis&gt;</a:t>
             </a:fld>
             <a:endParaRPr b="0" lang="lv-LV" sz="1200" spc="-1" strike="noStrike">
               <a:latin typeface="Times New Roman"/>
@@ -485,7 +494,7 @@
       </p:grpSpPr>
       <p:sp>
         <p:nvSpPr>
-          <p:cNvPr id="280" name="PlaceHolder 1"/>
+          <p:cNvPr id="316" name="PlaceHolder 1"/>
           <p:cNvSpPr>
             <a:spLocks noGrp="1"/>
           </p:cNvSpPr>
@@ -496,7 +505,7 @@
         <p:spPr>
           <a:xfrm>
             <a:off x="685800" y="1143000"/>
-            <a:ext cx="5485680" cy="3085560"/>
+            <a:ext cx="5484960" cy="3084840"/>
           </a:xfrm>
           <a:prstGeom prst="rect">
             <a:avLst/>
@@ -508,7 +517,7 @@
       </p:sp>
       <p:sp>
         <p:nvSpPr>
-          <p:cNvPr id="281" name="PlaceHolder 2"/>
+          <p:cNvPr id="317" name="PlaceHolder 2"/>
           <p:cNvSpPr>
             <a:spLocks noGrp="1"/>
           </p:cNvSpPr>
@@ -519,7 +528,7 @@
         <p:spPr>
           <a:xfrm>
             <a:off x="685800" y="4400640"/>
-            <a:ext cx="5485680" cy="3599640"/>
+            <a:ext cx="5484960" cy="3598920"/>
           </a:xfrm>
           <a:prstGeom prst="rect">
             <a:avLst/>
@@ -600,7 +609,7 @@
       </p:sp>
       <p:sp>
         <p:nvSpPr>
-          <p:cNvPr id="282" name="PlaceHolder 3"/>
+          <p:cNvPr id="318" name="PlaceHolder 3"/>
           <p:cNvSpPr>
             <a:spLocks noGrp="1"/>
           </p:cNvSpPr>
@@ -611,7 +620,7 @@
         <p:spPr>
           <a:xfrm>
             <a:off x="3884760" y="8685360"/>
-            <a:ext cx="2971080" cy="457920"/>
+            <a:ext cx="2970360" cy="457200"/>
           </a:xfrm>
           <a:prstGeom prst="rect">
             <a:avLst/>
@@ -632,11 +641,11 @@
               </a:lnSpc>
               <a:buNone/>
             </a:pPr>
-            <a:fld id="{5BE72AD9-C97D-44C1-B5AA-42ECC691B3C9}" type="slidenum">
+            <a:fld id="{D343C772-CF3A-40A8-B72D-F3848E36E588}" type="slidenum">
               <a:rPr b="0" lang="lv-LV" sz="1200" spc="-1" strike="noStrike">
                 <a:latin typeface="Times New Roman"/>
               </a:rPr>
-              <a:t>8</a:t>
+              <a:t>&lt;skaitlis&gt;</a:t>
             </a:fld>
             <a:endParaRPr b="0" lang="lv-LV" sz="1200" spc="-1" strike="noStrike">
               <a:latin typeface="Times New Roman"/>
@@ -668,7 +677,7 @@
       </p:grpSpPr>
       <p:sp>
         <p:nvSpPr>
-          <p:cNvPr id="283" name="PlaceHolder 1"/>
+          <p:cNvPr id="319" name="PlaceHolder 1"/>
           <p:cNvSpPr>
             <a:spLocks noGrp="1"/>
           </p:cNvSpPr>
@@ -679,7 +688,7 @@
         <p:spPr>
           <a:xfrm>
             <a:off x="685800" y="1143000"/>
-            <a:ext cx="5485680" cy="3085560"/>
+            <a:ext cx="5484960" cy="3084840"/>
           </a:xfrm>
           <a:prstGeom prst="rect">
             <a:avLst/>
@@ -691,7 +700,7 @@
       </p:sp>
       <p:sp>
         <p:nvSpPr>
-          <p:cNvPr id="284" name="PlaceHolder 2"/>
+          <p:cNvPr id="320" name="PlaceHolder 2"/>
           <p:cNvSpPr>
             <a:spLocks noGrp="1"/>
           </p:cNvSpPr>
@@ -702,7 +711,7 @@
         <p:spPr>
           <a:xfrm>
             <a:off x="685800" y="4400640"/>
-            <a:ext cx="5485680" cy="3599640"/>
+            <a:ext cx="5484960" cy="3598920"/>
           </a:xfrm>
           <a:prstGeom prst="rect">
             <a:avLst/>
@@ -783,7 +792,7 @@
       </p:sp>
       <p:sp>
         <p:nvSpPr>
-          <p:cNvPr id="285" name="PlaceHolder 3"/>
+          <p:cNvPr id="321" name="PlaceHolder 3"/>
           <p:cNvSpPr>
             <a:spLocks noGrp="1"/>
           </p:cNvSpPr>
@@ -794,7 +803,7 @@
         <p:spPr>
           <a:xfrm>
             <a:off x="3884760" y="8685360"/>
-            <a:ext cx="2971080" cy="457920"/>
+            <a:ext cx="2970360" cy="457200"/>
           </a:xfrm>
           <a:prstGeom prst="rect">
             <a:avLst/>
@@ -815,7 +824,7 @@
               </a:lnSpc>
               <a:buNone/>
             </a:pPr>
-            <a:fld id="{A7CABDFB-43C3-4657-9A45-40ECC2E4E896}" type="slidenum">
+            <a:fld id="{5265178E-5AAC-49DC-B236-9296E9DFE443}" type="slidenum">
               <a:rPr b="0" lang="lv-LV" sz="1200" spc="-1" strike="noStrike">
                 <a:latin typeface="Times New Roman"/>
               </a:rPr>
@@ -851,7 +860,7 @@
       </p:grpSpPr>
       <p:sp>
         <p:nvSpPr>
-          <p:cNvPr id="286" name="PlaceHolder 1"/>
+          <p:cNvPr id="322" name="PlaceHolder 1"/>
           <p:cNvSpPr>
             <a:spLocks noGrp="1"/>
           </p:cNvSpPr>
@@ -862,7 +871,7 @@
         <p:spPr>
           <a:xfrm>
             <a:off x="685800" y="1143000"/>
-            <a:ext cx="5485680" cy="3085560"/>
+            <a:ext cx="5484960" cy="3084840"/>
           </a:xfrm>
           <a:prstGeom prst="rect">
             <a:avLst/>
@@ -874,7 +883,7 @@
       </p:sp>
       <p:sp>
         <p:nvSpPr>
-          <p:cNvPr id="287" name="PlaceHolder 2"/>
+          <p:cNvPr id="323" name="PlaceHolder 2"/>
           <p:cNvSpPr>
             <a:spLocks noGrp="1"/>
           </p:cNvSpPr>
@@ -885,7 +894,7 @@
         <p:spPr>
           <a:xfrm>
             <a:off x="685800" y="4400640"/>
-            <a:ext cx="5485680" cy="3599640"/>
+            <a:ext cx="5484960" cy="3598920"/>
           </a:xfrm>
           <a:prstGeom prst="rect">
             <a:avLst/>
@@ -943,7 +952,7 @@
       </p:sp>
       <p:sp>
         <p:nvSpPr>
-          <p:cNvPr id="288" name="PlaceHolder 3"/>
+          <p:cNvPr id="324" name="PlaceHolder 3"/>
           <p:cNvSpPr>
             <a:spLocks noGrp="1"/>
           </p:cNvSpPr>
@@ -954,7 +963,7 @@
         <p:spPr>
           <a:xfrm>
             <a:off x="3884760" y="8685360"/>
-            <a:ext cx="2971080" cy="457920"/>
+            <a:ext cx="2970360" cy="457200"/>
           </a:xfrm>
           <a:prstGeom prst="rect">
             <a:avLst/>
@@ -975,7 +984,7 @@
               </a:lnSpc>
               <a:buNone/>
             </a:pPr>
-            <a:fld id="{1EBB0F8A-6F44-4EF3-B452-0F0B7CDF5907}" type="slidenum">
+            <a:fld id="{C091AABB-B282-4D44-B07E-B8429B2849DD}" type="slidenum">
               <a:rPr b="0" lang="lv-LV" sz="1200" spc="-1" strike="noStrike">
                 <a:latin typeface="Times New Roman"/>
               </a:rPr>
@@ -1011,7 +1020,7 @@
       </p:grpSpPr>
       <p:sp>
         <p:nvSpPr>
-          <p:cNvPr id="289" name="PlaceHolder 1"/>
+          <p:cNvPr id="325" name="PlaceHolder 1"/>
           <p:cNvSpPr>
             <a:spLocks noGrp="1"/>
           </p:cNvSpPr>
@@ -1022,7 +1031,7 @@
         <p:spPr>
           <a:xfrm>
             <a:off x="685800" y="1143000"/>
-            <a:ext cx="5485680" cy="3085560"/>
+            <a:ext cx="5484960" cy="3084840"/>
           </a:xfrm>
           <a:prstGeom prst="rect">
             <a:avLst/>
@@ -1034,7 +1043,7 @@
       </p:sp>
       <p:sp>
         <p:nvSpPr>
-          <p:cNvPr id="290" name="PlaceHolder 2"/>
+          <p:cNvPr id="326" name="PlaceHolder 2"/>
           <p:cNvSpPr>
             <a:spLocks noGrp="1"/>
           </p:cNvSpPr>
@@ -1045,7 +1054,7 @@
         <p:spPr>
           <a:xfrm>
             <a:off x="685800" y="4400640"/>
-            <a:ext cx="5485680" cy="3599640"/>
+            <a:ext cx="5484960" cy="3598920"/>
           </a:xfrm>
           <a:prstGeom prst="rect">
             <a:avLst/>
@@ -1083,7 +1092,7 @@
       </p:sp>
       <p:sp>
         <p:nvSpPr>
-          <p:cNvPr id="291" name="PlaceHolder 3"/>
+          <p:cNvPr id="327" name="PlaceHolder 3"/>
           <p:cNvSpPr>
             <a:spLocks noGrp="1"/>
           </p:cNvSpPr>
@@ -1094,7 +1103,7 @@
         <p:spPr>
           <a:xfrm>
             <a:off x="3884760" y="8685360"/>
-            <a:ext cx="2971080" cy="457920"/>
+            <a:ext cx="2970360" cy="457200"/>
           </a:xfrm>
           <a:prstGeom prst="rect">
             <a:avLst/>
@@ -1115,7 +1124,7 @@
               </a:lnSpc>
               <a:buNone/>
             </a:pPr>
-            <a:fld id="{07450580-6B00-4D19-B59C-7ACE7D7C24DE}" type="slidenum">
+            <a:fld id="{C34E7241-97E4-40DF-8D54-39B639CF4D09}" type="slidenum">
               <a:rPr b="0" lang="lv-LV" sz="1200" spc="-1" strike="noStrike">
                 <a:latin typeface="Times New Roman"/>
               </a:rPr>
@@ -10343,7 +10352,7 @@
         <p:spPr>
           <a:xfrm>
             <a:off x="0" y="0"/>
-            <a:ext cx="12191400" cy="4571280"/>
+            <a:ext cx="12190680" cy="4570560"/>
           </a:xfrm>
           <a:prstGeom prst="rect">
             <a:avLst/>
@@ -10381,7 +10390,7 @@
         <p:spPr>
           <a:xfrm>
             <a:off x="0" y="0"/>
-            <a:ext cx="12191400" cy="4571280"/>
+            <a:ext cx="12190680" cy="4570560"/>
           </a:xfrm>
           <a:custGeom>
             <a:avLst/>
@@ -19016,8 +19025,8 @@
         </p:nvSpPr>
         <p:spPr>
           <a:xfrm>
-            <a:off x="457200" y="4960080"/>
-            <a:ext cx="7771680" cy="1462320"/>
+            <a:off x="609480" y="273600"/>
+            <a:ext cx="10972440" cy="1144800"/>
           </a:xfrm>
           <a:prstGeom prst="rect">
             <a:avLst/>
@@ -19032,13 +19041,16 @@
             <a:noAutofit/>
           </a:bodyPr>
           <a:p>
+            <a:pPr algn="ctr">
+              <a:buNone/>
+            </a:pPr>
             <a:r>
-              <a:rPr b="0" lang="lv-LV" sz="1800" spc="-1" strike="noStrike">
+              <a:rPr b="0" lang="lv-LV" sz="4400" spc="-1" strike="noStrike">
                 <a:latin typeface="Arial"/>
               </a:rPr>
               <a:t>Klikšķiniet, lai rediģētu virsraksta teksta formātu</a:t>
             </a:r>
-            <a:endParaRPr b="0" lang="lv-LV" sz="1800" spc="-1" strike="noStrike">
+            <a:endParaRPr b="0" lang="lv-LV" sz="4400" spc="-1" strike="noStrike">
               <a:latin typeface="Arial"/>
             </a:endParaRPr>
           </a:p>
@@ -19925,8 +19937,8 @@
         </p:nvSpPr>
         <p:spPr>
           <a:xfrm>
-            <a:off x="457200" y="4960080"/>
-            <a:ext cx="7771680" cy="1462320"/>
+            <a:off x="609480" y="273600"/>
+            <a:ext cx="10972080" cy="1144440"/>
           </a:xfrm>
           <a:prstGeom prst="rect">
             <a:avLst/>
@@ -19965,8 +19977,8 @@
         </p:nvSpPr>
         <p:spPr>
           <a:xfrm>
-            <a:off x="8610480" y="4960080"/>
-            <a:ext cx="1560960" cy="1462320"/>
+            <a:off x="609480" y="1604520"/>
+            <a:ext cx="5353920" cy="3976920"/>
           </a:xfrm>
           <a:prstGeom prst="rect">
             <a:avLst/>
@@ -19978,7 +19990,7 @@
         </p:spPr>
         <p:txBody>
           <a:bodyPr lIns="0" rIns="0" tIns="0" bIns="0" anchor="t">
-            <a:normAutofit fontScale="35000"/>
+            <a:normAutofit/>
           </a:bodyPr>
           <a:p>
             <a:pPr marL="432000" indent="-324000">
@@ -20148,8 +20160,8 @@
         </p:nvSpPr>
         <p:spPr>
           <a:xfrm>
-            <a:off x="10250280" y="4960080"/>
-            <a:ext cx="1560960" cy="1462320"/>
+            <a:off x="6231960" y="1604520"/>
+            <a:ext cx="5353920" cy="3976920"/>
           </a:xfrm>
           <a:prstGeom prst="rect">
             <a:avLst/>
@@ -20161,7 +20173,7 @@
         </p:spPr>
         <p:txBody>
           <a:bodyPr lIns="0" rIns="0" tIns="0" bIns="0" anchor="t">
-            <a:normAutofit fontScale="35000"/>
+            <a:normAutofit/>
           </a:bodyPr>
           <a:p>
             <a:pPr marL="432000" indent="-324000">
@@ -20409,8 +20421,8 @@
         </p:nvSpPr>
         <p:spPr>
           <a:xfrm>
-            <a:off x="457200" y="4960080"/>
-            <a:ext cx="7771680" cy="1462320"/>
+            <a:off x="609480" y="273600"/>
+            <a:ext cx="10972080" cy="1144440"/>
           </a:xfrm>
           <a:prstGeom prst="rect">
             <a:avLst/>
@@ -20707,7 +20719,7 @@
         <p:spPr>
           <a:xfrm>
             <a:off x="0" y="0"/>
-            <a:ext cx="12191400" cy="4571280"/>
+            <a:ext cx="12190680" cy="4570560"/>
           </a:xfrm>
           <a:prstGeom prst="rect">
             <a:avLst/>
@@ -20745,7 +20757,7 @@
         <p:spPr>
           <a:xfrm>
             <a:off x="0" y="0"/>
-            <a:ext cx="12191400" cy="4571280"/>
+            <a:ext cx="12190680" cy="4570560"/>
           </a:xfrm>
           <a:custGeom>
             <a:avLst/>
@@ -29644,7 +29656,7 @@
         <p:spPr>
           <a:xfrm>
             <a:off x="457200" y="4960080"/>
-            <a:ext cx="7771680" cy="1462320"/>
+            <a:ext cx="7770960" cy="1461600"/>
           </a:xfrm>
           <a:prstGeom prst="rect">
             <a:avLst/>
@@ -29666,7 +29678,7 @@
               <a:buNone/>
             </a:pPr>
             <a:r>
-              <a:rPr b="0" lang="lv-LV" sz="3600" spc="197" strike="noStrike" cap="all">
+              <a:rPr b="0" lang="lv-LV" sz="3600" spc="191" strike="noStrike" cap="all">
                 <a:solidFill>
                   <a:srgbClr val="0d0d0d"/>
                 </a:solidFill>
@@ -29693,7 +29705,7 @@
         <p:spPr>
           <a:xfrm>
             <a:off x="8610480" y="4960080"/>
-            <a:ext cx="3199680" cy="1462320"/>
+            <a:ext cx="3198960" cy="1461600"/>
           </a:xfrm>
           <a:prstGeom prst="rect">
             <a:avLst/>
@@ -29890,7 +29902,7 @@
         <p:spPr>
           <a:xfrm>
             <a:off x="1024200" y="585360"/>
-            <a:ext cx="9719280" cy="1499040"/>
+            <a:ext cx="9718560" cy="1498320"/>
           </a:xfrm>
           <a:prstGeom prst="rect">
             <a:avLst/>
@@ -29912,7 +29924,7 @@
               <a:buNone/>
             </a:pPr>
             <a:r>
-              <a:rPr b="0" lang="lv-LV" sz="5000" spc="94" strike="noStrike" cap="all">
+              <a:rPr b="0" lang="lv-LV" sz="5000" spc="89" strike="noStrike" cap="all">
                 <a:solidFill>
                   <a:srgbClr val="0d0d0d"/>
                 </a:solidFill>
@@ -29940,7 +29952,7 @@
         <p:spPr>
           <a:xfrm>
             <a:off x="250560" y="1804680"/>
-            <a:ext cx="11736000" cy="4224960"/>
+            <a:ext cx="11735280" cy="4224240"/>
           </a:xfrm>
           <a:prstGeom prst="rect">
             <a:avLst/>
@@ -29993,7 +30005,7 @@
         <p:spPr>
           <a:xfrm>
             <a:off x="1024200" y="585360"/>
-            <a:ext cx="9719280" cy="1499040"/>
+            <a:ext cx="9718560" cy="1498320"/>
           </a:xfrm>
           <a:prstGeom prst="rect">
             <a:avLst/>
@@ -30015,7 +30027,7 @@
               <a:buNone/>
             </a:pPr>
             <a:r>
-              <a:rPr b="0" lang="lv-LV" sz="5000" spc="94" strike="noStrike" cap="all">
+              <a:rPr b="0" lang="lv-LV" sz="5000" spc="89" strike="noStrike" cap="all">
                 <a:solidFill>
                   <a:srgbClr val="0d0d0d"/>
                 </a:solidFill>
@@ -30042,7 +30054,7 @@
         <p:spPr>
           <a:xfrm>
             <a:off x="113760" y="2628720"/>
-            <a:ext cx="11963880" cy="1599480"/>
+            <a:ext cx="11963160" cy="1598760"/>
           </a:xfrm>
           <a:prstGeom prst="rect">
             <a:avLst/>
@@ -30095,7 +30107,7 @@
         <p:spPr>
           <a:xfrm>
             <a:off x="1024200" y="585360"/>
-            <a:ext cx="9719280" cy="1499040"/>
+            <a:ext cx="9718560" cy="1498320"/>
           </a:xfrm>
           <a:prstGeom prst="rect">
             <a:avLst/>
@@ -30117,7 +30129,7 @@
               <a:buNone/>
             </a:pPr>
             <a:r>
-              <a:rPr b="0" lang="lv-LV" sz="5000" spc="94" strike="noStrike" cap="all">
+              <a:rPr b="0" lang="lv-LV" sz="5000" spc="89" strike="noStrike" cap="all">
                 <a:solidFill>
                   <a:srgbClr val="0d0d0d"/>
                 </a:solidFill>
@@ -30140,7 +30152,7 @@
         <p:spPr>
           <a:xfrm>
             <a:off x="1024200" y="2084760"/>
-            <a:ext cx="6093360" cy="364320"/>
+            <a:ext cx="6092640" cy="363960"/>
           </a:xfrm>
           <a:prstGeom prst="rect">
             <a:avLst/>
@@ -30197,7 +30209,7 @@
         <p:spPr>
           <a:xfrm>
             <a:off x="349200" y="2855880"/>
-            <a:ext cx="11493000" cy="2767680"/>
+            <a:ext cx="11492280" cy="2766960"/>
           </a:xfrm>
           <a:prstGeom prst="rect">
             <a:avLst/>
@@ -30249,8 +30261,8 @@
         </p:nvSpPr>
         <p:spPr>
           <a:xfrm>
-            <a:off x="457200" y="4960080"/>
-            <a:ext cx="7771680" cy="1462320"/>
+            <a:off x="609480" y="273600"/>
+            <a:ext cx="10971720" cy="1144080"/>
           </a:xfrm>
           <a:prstGeom prst="rect">
             <a:avLst/>
@@ -30261,45 +30273,362 @@
           </a:ln>
         </p:spPr>
         <p:txBody>
-          <a:bodyPr lIns="90000" rIns="90000" tIns="45000" bIns="45000" anchor="ctr">
+          <a:bodyPr lIns="0" rIns="0" tIns="0" bIns="0" anchor="ctr">
             <a:noAutofit/>
           </a:bodyPr>
           <a:p>
-            <a:pPr algn="r">
+            <a:pPr algn="ctr">
               <a:lnSpc>
-                <a:spcPct val="80000"/>
+                <a:spcPct val="100000"/>
               </a:lnSpc>
               <a:buNone/>
             </a:pPr>
             <a:r>
-              <a:rPr b="0" lang="lv-LV" sz="5000" spc="197" strike="noStrike" cap="all">
-                <a:solidFill>
-                  <a:srgbClr val="0d0d0d"/>
-                </a:solidFill>
-                <a:latin typeface="Tw Cen MT Condensed"/>
+              <a:rPr b="0" lang="lv-LV" sz="4400" spc="-1" strike="noStrike">
+                <a:latin typeface="Arial"/>
               </a:rPr>
-              <a:t>Paldies par uzmanību!</a:t>
+              <a:t>Terraform struktūra</a:t>
             </a:r>
-            <a:endParaRPr b="0" lang="lv-LV" sz="5000" spc="-1" strike="noStrike">
+            <a:endParaRPr b="0" lang="lv-LV" sz="4400" spc="-1" strike="noStrike">
               <a:latin typeface="Arial"/>
             </a:endParaRPr>
           </a:p>
         </p:txBody>
       </p:sp>
+      <p:pic>
+        <p:nvPicPr>
+          <p:cNvPr id="276" name="" descr=""/>
+          <p:cNvPicPr/>
+          <p:nvPr/>
+        </p:nvPicPr>
+        <p:blipFill>
+          <a:blip r:embed="rId1"/>
+          <a:stretch/>
+        </p:blipFill>
+        <p:spPr>
+          <a:xfrm>
+            <a:off x="8538840" y="1260000"/>
+            <a:ext cx="3652920" cy="5445360"/>
+          </a:xfrm>
+          <a:prstGeom prst="rect">
+            <a:avLst/>
+          </a:prstGeom>
+          <a:ln w="0">
+            <a:noFill/>
+          </a:ln>
+        </p:spPr>
+      </p:pic>
       <p:sp>
         <p:nvSpPr>
-          <p:cNvPr id="276" name="PlaceHolder 2"/>
+          <p:cNvPr id="277" name=""/>
+          <p:cNvSpPr/>
+          <p:nvPr/>
+        </p:nvSpPr>
+        <p:spPr>
+          <a:xfrm>
+            <a:off x="900000" y="1418040"/>
+            <a:ext cx="7019640" cy="5061600"/>
+          </a:xfrm>
+          <a:prstGeom prst="rect">
+            <a:avLst/>
+          </a:prstGeom>
+          <a:noFill/>
+          <a:ln w="0">
+            <a:noFill/>
+          </a:ln>
+        </p:spPr>
+        <p:style>
+          <a:lnRef idx="0"/>
+          <a:fillRef idx="0"/>
+          <a:effectRef idx="0"/>
+          <a:fontRef idx="minor"/>
+        </p:style>
+        <p:txBody>
+          <a:bodyPr lIns="90000" rIns="90000" tIns="45000" bIns="45000" anchor="t">
+            <a:noAutofit/>
+          </a:bodyPr>
+          <a:p>
+            <a:pPr>
+              <a:lnSpc>
+                <a:spcPct val="100000"/>
+              </a:lnSpc>
+              <a:buNone/>
+            </a:pPr>
+            <a:r>
+              <a:rPr b="0" lang="lv-LV" sz="1800" spc="-1" strike="noStrike">
+                <a:latin typeface="Arial"/>
+              </a:rPr>
+              <a:t>Terraform direktorija satur:</a:t>
+            </a:r>
+            <a:endParaRPr b="0" lang="lv-LV" sz="1800" spc="-1" strike="noStrike">
+              <a:latin typeface="Arial"/>
+            </a:endParaRPr>
+          </a:p>
+          <a:p>
+            <a:pPr>
+              <a:lnSpc>
+                <a:spcPct val="100000"/>
+              </a:lnSpc>
+              <a:buNone/>
+            </a:pPr>
+            <a:r>
+              <a:rPr b="0" lang="lv-LV" sz="1800" spc="-1" strike="noStrike">
+                <a:latin typeface="Arial"/>
+              </a:rPr>
+              <a:t>• </a:t>
+            </a:r>
+            <a:r>
+              <a:rPr b="0" lang="lv-LV" sz="1800" spc="-1" strike="noStrike">
+                <a:latin typeface="Arial"/>
+              </a:rPr>
+              <a:t>root direktorijā terraform failus, kur definēti un sasaistīti visi terraform moduļi, zem /modules direktorijas</a:t>
+            </a:r>
+            <a:endParaRPr b="0" lang="lv-LV" sz="1800" spc="-1" strike="noStrike">
+              <a:latin typeface="Arial"/>
+            </a:endParaRPr>
+          </a:p>
+          <a:p>
+            <a:pPr>
+              <a:lnSpc>
+                <a:spcPct val="100000"/>
+              </a:lnSpc>
+              <a:buNone/>
+            </a:pPr>
+            <a:endParaRPr b="0" lang="lv-LV" sz="1800" spc="-1" strike="noStrike">
+              <a:latin typeface="Arial"/>
+            </a:endParaRPr>
+          </a:p>
+          <a:p>
+            <a:pPr>
+              <a:lnSpc>
+                <a:spcPct val="100000"/>
+              </a:lnSpc>
+              <a:buNone/>
+            </a:pPr>
+            <a:r>
+              <a:rPr b="0" lang="lv-LV" sz="1800" spc="-1" strike="noStrike">
+                <a:latin typeface="Arial"/>
+              </a:rPr>
+              <a:t>• </a:t>
+            </a:r>
+            <a:r>
+              <a:rPr b="0" lang="lv-LV" sz="1800" spc="-1" strike="noStrike">
+                <a:latin typeface="Arial"/>
+              </a:rPr>
+              <a:t>modules direktorija ir visi nepieciešamie terraform moduļi:</a:t>
+            </a:r>
+            <a:endParaRPr b="0" lang="lv-LV" sz="1800" spc="-1" strike="noStrike">
+              <a:latin typeface="Arial"/>
+            </a:endParaRPr>
+          </a:p>
+          <a:p>
+            <a:pPr>
+              <a:lnSpc>
+                <a:spcPct val="100000"/>
+              </a:lnSpc>
+              <a:buNone/>
+            </a:pPr>
+            <a:r>
+              <a:rPr b="0" lang="lv-LV" sz="1800" spc="-1" strike="noStrike">
+                <a:latin typeface="Arial"/>
+              </a:rPr>
+              <a:t>	</a:t>
+            </a:r>
+            <a:r>
+              <a:rPr b="0" lang="lv-LV" sz="1800" spc="-1" strike="noStrike">
+                <a:latin typeface="Arial"/>
+              </a:rPr>
+              <a:t>• </a:t>
+            </a:r>
+            <a:r>
+              <a:rPr b="0" lang="lv-LV" sz="1800" spc="-1" strike="noStrike">
+                <a:latin typeface="Arial"/>
+              </a:rPr>
+              <a:t>EC2 dirketorija satur 2 moduļus -</a:t>
+            </a:r>
+            <a:endParaRPr b="0" lang="lv-LV" sz="1800" spc="-1" strike="noStrike">
+              <a:latin typeface="Arial"/>
+            </a:endParaRPr>
+          </a:p>
+          <a:p>
+            <a:pPr>
+              <a:lnSpc>
+                <a:spcPct val="100000"/>
+              </a:lnSpc>
+              <a:buNone/>
+            </a:pPr>
+            <a:r>
+              <a:rPr b="0" lang="lv-LV" sz="1800" spc="-1" strike="noStrike">
+                <a:latin typeface="Arial"/>
+              </a:rPr>
+              <a:t>	</a:t>
+            </a:r>
+            <a:r>
+              <a:rPr b="0" lang="lv-LV" sz="1800" spc="-1" strike="noStrike">
+                <a:latin typeface="Arial"/>
+              </a:rPr>
+              <a:t>apache un cassandra</a:t>
+            </a:r>
+            <a:endParaRPr b="0" lang="lv-LV" sz="1800" spc="-1" strike="noStrike">
+              <a:latin typeface="Arial"/>
+            </a:endParaRPr>
+          </a:p>
+          <a:p>
+            <a:pPr>
+              <a:lnSpc>
+                <a:spcPct val="100000"/>
+              </a:lnSpc>
+              <a:buNone/>
+            </a:pPr>
+            <a:r>
+              <a:rPr b="0" lang="lv-LV" sz="1800" spc="-1" strike="noStrike">
+                <a:latin typeface="Arial"/>
+              </a:rPr>
+              <a:t>	</a:t>
+            </a:r>
+            <a:r>
+              <a:rPr b="0" lang="lv-LV" sz="1800" spc="-1" strike="noStrike">
+                <a:latin typeface="Arial"/>
+              </a:rPr>
+              <a:t>• </a:t>
+            </a:r>
+            <a:r>
+              <a:rPr b="0" lang="lv-LV" sz="1800" spc="-1" strike="noStrike">
+                <a:latin typeface="Arial"/>
+              </a:rPr>
+              <a:t>VPC modulis satur visu nepieciešamo </a:t>
+            </a:r>
+            <a:r>
+              <a:rPr b="0" lang="lv-LV" sz="1800" spc="-1" strike="noStrike">
+                <a:latin typeface="Arial"/>
+              </a:rPr>
+              <a:t>	</a:t>
+            </a:r>
+            <a:r>
+              <a:rPr b="0" lang="lv-LV" sz="1800" spc="-1" strike="noStrike">
+                <a:latin typeface="Arial"/>
+              </a:rPr>
+              <a:t>tīkla izveidei </a:t>
+            </a:r>
+            <a:r>
+              <a:rPr b="0" lang="lv-LV" sz="1800" spc="-1" strike="noStrike">
+                <a:latin typeface="Arial"/>
+              </a:rPr>
+              <a:t>	</a:t>
+            </a:r>
+            <a:r>
+              <a:rPr b="0" lang="lv-LV" sz="1800" spc="-1" strike="noStrike">
+                <a:latin typeface="Arial"/>
+              </a:rPr>
+              <a:t>iekš aws  </a:t>
+            </a:r>
+            <a:r>
+              <a:rPr b="0" lang="lv-LV" sz="1800" spc="-1" strike="noStrike">
+                <a:latin typeface="Arial"/>
+              </a:rPr>
+              <a:t>	</a:t>
+            </a:r>
+            <a:r>
+              <a:rPr b="0" lang="lv-LV" sz="1800" spc="-1" strike="noStrike">
+                <a:latin typeface="Arial"/>
+              </a:rPr>
+              <a:t>apache un cassandra moduļiem.</a:t>
+            </a:r>
+            <a:endParaRPr b="0" lang="lv-LV" sz="1800" spc="-1" strike="noStrike">
+              <a:latin typeface="Arial"/>
+            </a:endParaRPr>
+          </a:p>
+          <a:p>
+            <a:pPr>
+              <a:lnSpc>
+                <a:spcPct val="100000"/>
+              </a:lnSpc>
+              <a:buNone/>
+            </a:pPr>
+            <a:endParaRPr b="0" lang="lv-LV" sz="1800" spc="-1" strike="noStrike">
+              <a:latin typeface="Arial"/>
+            </a:endParaRPr>
+          </a:p>
+          <a:p>
+            <a:pPr>
+              <a:lnSpc>
+                <a:spcPct val="100000"/>
+              </a:lnSpc>
+              <a:buNone/>
+            </a:pPr>
+            <a:r>
+              <a:rPr b="0" lang="lv-LV" sz="1800" spc="-1" strike="noStrike">
+                <a:latin typeface="Arial"/>
+              </a:rPr>
+              <a:t>• </a:t>
+            </a:r>
+            <a:r>
+              <a:rPr b="0" lang="lv-LV" sz="1800" spc="-1" strike="noStrike">
+                <a:latin typeface="Arial"/>
+              </a:rPr>
+              <a:t>assets direktorijā tiek glabāts viss pārējais kas nepieciešams terraform, piemēram template, ssh atslēgas un skripti</a:t>
+            </a:r>
+            <a:endParaRPr b="0" lang="lv-LV" sz="1800" spc="-1" strike="noStrike">
+              <a:latin typeface="Arial"/>
+            </a:endParaRPr>
+          </a:p>
+          <a:p>
+            <a:pPr>
+              <a:lnSpc>
+                <a:spcPct val="100000"/>
+              </a:lnSpc>
+              <a:buNone/>
+            </a:pPr>
+            <a:endParaRPr b="0" lang="lv-LV" sz="1800" spc="-1" strike="noStrike">
+              <a:latin typeface="Arial"/>
+            </a:endParaRPr>
+          </a:p>
+        </p:txBody>
+      </p:sp>
+    </p:spTree>
+  </p:cSld>
+  <mc:AlternateContent>
+    <mc:Choice Requires="p14">
+      <p:transition spd="slow" p14:dur="2000"/>
+    </mc:Choice>
+    <mc:Fallback>
+      <p:transition spd="slow"/>
+    </mc:Fallback>
+  </mc:AlternateContent>
+</p:sld>
+</file>
+
+<file path=ppt/slides/slide14.xml><?xml version="1.0" encoding="utf-8"?>
+<p:sld xmlns:a="http://schemas.openxmlformats.org/drawingml/2006/main" xmlns:p="http://schemas.openxmlformats.org/presentationml/2006/main" xmlns:r="http://schemas.openxmlformats.org/officeDocument/2006/relationships" xmlns:p14="http://schemas.microsoft.com/office/powerpoint/2010/main" xmlns:p15="http://schemas.microsoft.com/office/powerpoint/2012/main" xmlns:mc="http://schemas.openxmlformats.org/markup-compatibility/2006">
+  <p:cSld>
+    <p:spTree>
+      <p:nvGrpSpPr>
+        <p:cNvPr id="1" name=""/>
+        <p:cNvGrpSpPr/>
+        <p:nvPr/>
+      </p:nvGrpSpPr>
+      <p:grpSpPr>
+        <a:xfrm>
+          <a:off x="0" y="0"/>
+          <a:ext cx="0" cy="0"/>
+          <a:chOff x="0" y="0"/>
+          <a:chExt cx="0" cy="0"/>
+        </a:xfrm>
+      </p:grpSpPr>
+      <p:sp>
+        <p:nvSpPr>
+          <p:cNvPr id="278" name="PlaceHolder 1"/>
           <p:cNvSpPr>
             <a:spLocks noGrp="1"/>
           </p:cNvSpPr>
           <p:nvPr>
-            <p:ph/>
+            <p:ph type="title"/>
           </p:nvPr>
         </p:nvSpPr>
         <p:spPr>
           <a:xfrm>
-            <a:off x="8610480" y="4960080"/>
-            <a:ext cx="3199680" cy="1462320"/>
+            <a:off x="609480" y="273600"/>
+            <a:ext cx="10971720" cy="1144080"/>
           </a:xfrm>
           <a:prstGeom prst="rect">
             <a:avLst/>
@@ -30310,11 +30639,1422 @@
           </a:ln>
         </p:spPr>
         <p:txBody>
-          <a:bodyPr lIns="90000" rIns="90000" tIns="45000" bIns="45000" anchor="ctr">
+          <a:bodyPr lIns="0" rIns="0" tIns="0" bIns="0" anchor="ctr">
             <a:noAutofit/>
           </a:bodyPr>
           <a:p>
-            <a:endParaRPr b="0" lang="lv-LV" sz="3200" spc="-1" strike="noStrike">
+            <a:pPr algn="ctr">
+              <a:lnSpc>
+                <a:spcPct val="100000"/>
+              </a:lnSpc>
+              <a:buNone/>
+            </a:pPr>
+            <a:r>
+              <a:rPr b="0" lang="lv-LV" sz="4400" spc="-1" strike="noStrike">
+                <a:latin typeface="Arial"/>
+              </a:rPr>
+              <a:t>Terraform palaišana</a:t>
+            </a:r>
+            <a:endParaRPr b="0" lang="lv-LV" sz="4400" spc="-1" strike="noStrike">
+              <a:latin typeface="Arial"/>
+            </a:endParaRPr>
+          </a:p>
+        </p:txBody>
+      </p:sp>
+      <p:pic>
+        <p:nvPicPr>
+          <p:cNvPr id="279" name="" descr=""/>
+          <p:cNvPicPr/>
+          <p:nvPr/>
+        </p:nvPicPr>
+        <p:blipFill>
+          <a:blip r:embed="rId1"/>
+          <a:stretch/>
+        </p:blipFill>
+        <p:spPr>
+          <a:xfrm>
+            <a:off x="5940000" y="1620000"/>
+            <a:ext cx="5039640" cy="2173320"/>
+          </a:xfrm>
+          <a:prstGeom prst="rect">
+            <a:avLst/>
+          </a:prstGeom>
+          <a:ln w="0">
+            <a:noFill/>
+          </a:ln>
+        </p:spPr>
+      </p:pic>
+      <p:pic>
+        <p:nvPicPr>
+          <p:cNvPr id="280" name="" descr=""/>
+          <p:cNvPicPr/>
+          <p:nvPr/>
+        </p:nvPicPr>
+        <p:blipFill>
+          <a:blip r:embed="rId2"/>
+          <a:stretch/>
+        </p:blipFill>
+        <p:spPr>
+          <a:xfrm>
+            <a:off x="6300000" y="4435200"/>
+            <a:ext cx="4000320" cy="1504440"/>
+          </a:xfrm>
+          <a:prstGeom prst="rect">
+            <a:avLst/>
+          </a:prstGeom>
+          <a:ln w="0">
+            <a:noFill/>
+          </a:ln>
+        </p:spPr>
+      </p:pic>
+      <p:sp>
+        <p:nvSpPr>
+          <p:cNvPr id="281" name=""/>
+          <p:cNvSpPr/>
+          <p:nvPr/>
+        </p:nvSpPr>
+        <p:spPr>
+          <a:xfrm>
+            <a:off x="720000" y="1620000"/>
+            <a:ext cx="5039640" cy="2339640"/>
+          </a:xfrm>
+          <a:prstGeom prst="rect">
+            <a:avLst/>
+          </a:prstGeom>
+          <a:noFill/>
+          <a:ln w="0">
+            <a:noFill/>
+          </a:ln>
+        </p:spPr>
+        <p:style>
+          <a:lnRef idx="0"/>
+          <a:fillRef idx="0"/>
+          <a:effectRef idx="0"/>
+          <a:fontRef idx="minor"/>
+        </p:style>
+        <p:txBody>
+          <a:bodyPr lIns="90000" rIns="90000" tIns="45000" bIns="45000" anchor="t">
+            <a:noAutofit/>
+          </a:bodyPr>
+          <a:p>
+            <a:pPr>
+              <a:lnSpc>
+                <a:spcPct val="100000"/>
+              </a:lnSpc>
+              <a:buNone/>
+            </a:pPr>
+            <a:r>
+              <a:rPr b="0" lang="lv-LV" sz="1800" spc="-1" strike="noStrike">
+                <a:latin typeface="Arial"/>
+              </a:rPr>
+              <a:t>• </a:t>
+            </a:r>
+            <a:r>
+              <a:rPr b="0" lang="lv-LV" sz="1800" spc="-1" strike="noStrike">
+                <a:latin typeface="Arial"/>
+              </a:rPr>
+              <a:t>Lai palaistu Terraform nepieciešams atvērt root direktorijā esošo terraform.tfvars un nomainīt </a:t>
+            </a:r>
+            <a:endParaRPr b="0" lang="lv-LV" sz="1800" spc="-1" strike="noStrike">
+              <a:latin typeface="Arial"/>
+            </a:endParaRPr>
+          </a:p>
+          <a:p>
+            <a:pPr>
+              <a:lnSpc>
+                <a:spcPct val="100000"/>
+              </a:lnSpc>
+              <a:buNone/>
+            </a:pPr>
+            <a:r>
+              <a:rPr b="0" lang="lv-LV" sz="1800" spc="-1" strike="noStrike">
+                <a:latin typeface="Arial"/>
+              </a:rPr>
+              <a:t>- aws-private-key-location uz ceļu kur atrodās jūsu aws privātā atslēga un</a:t>
+            </a:r>
+            <a:endParaRPr b="0" lang="lv-LV" sz="1800" spc="-1" strike="noStrike">
+              <a:latin typeface="Arial"/>
+            </a:endParaRPr>
+          </a:p>
+          <a:p>
+            <a:pPr>
+              <a:lnSpc>
+                <a:spcPct val="100000"/>
+              </a:lnSpc>
+              <a:buNone/>
+            </a:pPr>
+            <a:r>
+              <a:rPr b="0" lang="lv-LV" sz="1800" spc="-1" strike="noStrike">
+                <a:latin typeface="Arial"/>
+              </a:rPr>
+              <a:t>- aws-access-key-name uz jūsu aws ģenerātā key-pair nosaukumu</a:t>
+            </a:r>
+            <a:endParaRPr b="0" lang="lv-LV" sz="1800" spc="-1" strike="noStrike">
+              <a:latin typeface="Arial"/>
+            </a:endParaRPr>
+          </a:p>
+        </p:txBody>
+      </p:sp>
+      <p:sp>
+        <p:nvSpPr>
+          <p:cNvPr id="282" name=""/>
+          <p:cNvSpPr/>
+          <p:nvPr/>
+        </p:nvSpPr>
+        <p:spPr>
+          <a:xfrm>
+            <a:off x="360000" y="4320000"/>
+            <a:ext cx="5939640" cy="1625760"/>
+          </a:xfrm>
+          <a:prstGeom prst="rect">
+            <a:avLst/>
+          </a:prstGeom>
+          <a:noFill/>
+          <a:ln w="0">
+            <a:noFill/>
+          </a:ln>
+        </p:spPr>
+        <p:style>
+          <a:lnRef idx="0"/>
+          <a:fillRef idx="0"/>
+          <a:effectRef idx="0"/>
+          <a:fontRef idx="minor"/>
+        </p:style>
+        <p:txBody>
+          <a:bodyPr lIns="90000" rIns="90000" tIns="45000" bIns="45000" anchor="t">
+            <a:noAutofit/>
+          </a:bodyPr>
+          <a:p>
+            <a:pPr>
+              <a:lnSpc>
+                <a:spcPct val="100000"/>
+              </a:lnSpc>
+              <a:buNone/>
+            </a:pPr>
+            <a:r>
+              <a:rPr b="0" lang="lv-LV" sz="1800" spc="-1" strike="noStrike">
+                <a:latin typeface="Arial"/>
+              </a:rPr>
+              <a:t>• </a:t>
+            </a:r>
+            <a:r>
+              <a:rPr b="0" lang="lv-LV" sz="1800" spc="-1" strike="noStrike">
+                <a:latin typeface="Arial"/>
+              </a:rPr>
+              <a:t>Papildus arī nepieciešams ģenerēt ssh atslēgas ansible master (privāto) un ansible host (publisko)</a:t>
+            </a:r>
+            <a:endParaRPr b="0" lang="lv-LV" sz="1800" spc="-1" strike="noStrike">
+              <a:latin typeface="Arial"/>
+            </a:endParaRPr>
+          </a:p>
+          <a:p>
+            <a:pPr>
+              <a:lnSpc>
+                <a:spcPct val="100000"/>
+              </a:lnSpc>
+              <a:buNone/>
+            </a:pPr>
+            <a:r>
+              <a:rPr b="0" lang="lv-LV" sz="1800" spc="-1" strike="noStrike">
+                <a:latin typeface="Arial"/>
+              </a:rPr>
+              <a:t>Esot projekta root direktorijā to var izdarīt ar komandām:</a:t>
+            </a:r>
+            <a:endParaRPr b="0" lang="lv-LV" sz="1800" spc="-1" strike="noStrike">
+              <a:latin typeface="Arial"/>
+            </a:endParaRPr>
+          </a:p>
+          <a:p>
+            <a:pPr>
+              <a:lnSpc>
+                <a:spcPct val="100000"/>
+              </a:lnSpc>
+              <a:buNone/>
+            </a:pPr>
+            <a:r>
+              <a:rPr b="0" lang="lv-LV" sz="1800" spc="-1" strike="noStrike">
+                <a:latin typeface="Arial"/>
+              </a:rPr>
+              <a:t>mkdir .\terraform\assets\secrets | cd</a:t>
+            </a:r>
+            <a:endParaRPr b="0" lang="lv-LV" sz="1800" spc="-1" strike="noStrike">
+              <a:latin typeface="Arial"/>
+            </a:endParaRPr>
+          </a:p>
+          <a:p>
+            <a:pPr>
+              <a:lnSpc>
+                <a:spcPct val="100000"/>
+              </a:lnSpc>
+              <a:buNone/>
+            </a:pPr>
+            <a:r>
+              <a:rPr b="0" lang="lv-LV" sz="1800" spc="-1" strike="noStrike">
+                <a:latin typeface="Arial"/>
+              </a:rPr>
+              <a:t>ssh-keygen -t rsa -N "" -q -f secret-key.pem</a:t>
+            </a:r>
+            <a:endParaRPr b="0" lang="lv-LV" sz="1800" spc="-1" strike="noStrike">
+              <a:latin typeface="Arial"/>
+            </a:endParaRPr>
+          </a:p>
+          <a:p>
+            <a:pPr>
+              <a:lnSpc>
+                <a:spcPct val="100000"/>
+              </a:lnSpc>
+              <a:buNone/>
+            </a:pPr>
+            <a:r>
+              <a:rPr b="0" lang="lv-LV" sz="1800" spc="-1" strike="noStrike">
+                <a:latin typeface="Arial"/>
+              </a:rPr>
+              <a:t>ren .\secret-key.pem.pub public-key.pub</a:t>
+            </a:r>
+            <a:endParaRPr b="0" lang="lv-LV" sz="1800" spc="-1" strike="noStrike">
+              <a:latin typeface="Arial"/>
+            </a:endParaRPr>
+          </a:p>
+        </p:txBody>
+      </p:sp>
+    </p:spTree>
+  </p:cSld>
+  <mc:AlternateContent>
+    <mc:Choice Requires="p14">
+      <p:transition spd="slow" p14:dur="2000"/>
+    </mc:Choice>
+    <mc:Fallback>
+      <p:transition spd="slow"/>
+    </mc:Fallback>
+  </mc:AlternateContent>
+</p:sld>
+</file>
+
+<file path=ppt/slides/slide15.xml><?xml version="1.0" encoding="utf-8"?>
+<p:sld xmlns:a="http://schemas.openxmlformats.org/drawingml/2006/main" xmlns:p="http://schemas.openxmlformats.org/presentationml/2006/main" xmlns:r="http://schemas.openxmlformats.org/officeDocument/2006/relationships" xmlns:p14="http://schemas.microsoft.com/office/powerpoint/2010/main" xmlns:p15="http://schemas.microsoft.com/office/powerpoint/2012/main" xmlns:mc="http://schemas.openxmlformats.org/markup-compatibility/2006">
+  <p:cSld>
+    <p:spTree>
+      <p:nvGrpSpPr>
+        <p:cNvPr id="1" name=""/>
+        <p:cNvGrpSpPr/>
+        <p:nvPr/>
+      </p:nvGrpSpPr>
+      <p:grpSpPr>
+        <a:xfrm>
+          <a:off x="0" y="0"/>
+          <a:ext cx="0" cy="0"/>
+          <a:chOff x="0" y="0"/>
+          <a:chExt cx="0" cy="0"/>
+        </a:xfrm>
+      </p:grpSpPr>
+      <p:sp>
+        <p:nvSpPr>
+          <p:cNvPr id="283" name="PlaceHolder 1"/>
+          <p:cNvSpPr>
+            <a:spLocks noGrp="1"/>
+          </p:cNvSpPr>
+          <p:nvPr>
+            <p:ph type="title"/>
+          </p:nvPr>
+        </p:nvSpPr>
+        <p:spPr>
+          <a:xfrm>
+            <a:off x="609480" y="273600"/>
+            <a:ext cx="10971720" cy="1144080"/>
+          </a:xfrm>
+          <a:prstGeom prst="rect">
+            <a:avLst/>
+          </a:prstGeom>
+          <a:noFill/>
+          <a:ln w="0">
+            <a:noFill/>
+          </a:ln>
+        </p:spPr>
+        <p:txBody>
+          <a:bodyPr lIns="0" rIns="0" tIns="0" bIns="0" anchor="ctr">
+            <a:noAutofit/>
+          </a:bodyPr>
+          <a:p>
+            <a:pPr algn="ctr">
+              <a:lnSpc>
+                <a:spcPct val="100000"/>
+              </a:lnSpc>
+              <a:buNone/>
+            </a:pPr>
+            <a:r>
+              <a:rPr b="0" lang="lv-LV" sz="4400" spc="-1" strike="noStrike">
+                <a:latin typeface="Arial"/>
+              </a:rPr>
+              <a:t>Ansible uzstādīšana caur Terraform</a:t>
+            </a:r>
+            <a:br/>
+            <a:r>
+              <a:rPr b="0" lang="lv-LV" sz="2600" spc="-1" strike="noStrike">
+                <a:latin typeface="Arial"/>
+              </a:rPr>
+              <a:t>(ansible hosts ģenerēšana)</a:t>
+            </a:r>
+            <a:endParaRPr b="0" lang="lv-LV" sz="2600" spc="-1" strike="noStrike">
+              <a:latin typeface="Arial"/>
+            </a:endParaRPr>
+          </a:p>
+        </p:txBody>
+      </p:sp>
+      <p:pic>
+        <p:nvPicPr>
+          <p:cNvPr id="284" name="" descr=""/>
+          <p:cNvPicPr/>
+          <p:nvPr/>
+        </p:nvPicPr>
+        <p:blipFill>
+          <a:blip r:embed="rId1"/>
+          <a:stretch/>
+        </p:blipFill>
+        <p:spPr>
+          <a:xfrm>
+            <a:off x="2700000" y="1437480"/>
+            <a:ext cx="5938920" cy="1982160"/>
+          </a:xfrm>
+          <a:prstGeom prst="rect">
+            <a:avLst/>
+          </a:prstGeom>
+          <a:ln w="0">
+            <a:noFill/>
+          </a:ln>
+        </p:spPr>
+      </p:pic>
+      <p:pic>
+        <p:nvPicPr>
+          <p:cNvPr id="285" name="" descr=""/>
+          <p:cNvPicPr/>
+          <p:nvPr/>
+        </p:nvPicPr>
+        <p:blipFill>
+          <a:blip r:embed="rId2"/>
+          <a:stretch/>
+        </p:blipFill>
+        <p:spPr>
+          <a:xfrm>
+            <a:off x="8820000" y="1339200"/>
+            <a:ext cx="2519640" cy="2080440"/>
+          </a:xfrm>
+          <a:prstGeom prst="rect">
+            <a:avLst/>
+          </a:prstGeom>
+          <a:ln w="0">
+            <a:noFill/>
+          </a:ln>
+        </p:spPr>
+      </p:pic>
+      <p:pic>
+        <p:nvPicPr>
+          <p:cNvPr id="286" name="" descr=""/>
+          <p:cNvPicPr/>
+          <p:nvPr/>
+        </p:nvPicPr>
+        <p:blipFill>
+          <a:blip r:embed="rId3"/>
+          <a:stretch/>
+        </p:blipFill>
+        <p:spPr>
+          <a:xfrm>
+            <a:off x="6120000" y="3600000"/>
+            <a:ext cx="5371920" cy="2971440"/>
+          </a:xfrm>
+          <a:prstGeom prst="rect">
+            <a:avLst/>
+          </a:prstGeom>
+          <a:ln w="0">
+            <a:noFill/>
+          </a:ln>
+        </p:spPr>
+      </p:pic>
+      <p:sp>
+        <p:nvSpPr>
+          <p:cNvPr id="287" name=""/>
+          <p:cNvSpPr/>
+          <p:nvPr/>
+        </p:nvSpPr>
+        <p:spPr>
+          <a:xfrm>
+            <a:off x="1080000" y="3600000"/>
+            <a:ext cx="4679640" cy="1625760"/>
+          </a:xfrm>
+          <a:prstGeom prst="rect">
+            <a:avLst/>
+          </a:prstGeom>
+          <a:noFill/>
+          <a:ln w="0">
+            <a:noFill/>
+          </a:ln>
+        </p:spPr>
+        <p:style>
+          <a:lnRef idx="0"/>
+          <a:fillRef idx="0"/>
+          <a:effectRef idx="0"/>
+          <a:fontRef idx="minor"/>
+        </p:style>
+        <p:txBody>
+          <a:bodyPr lIns="90000" rIns="90000" tIns="45000" bIns="45000" anchor="t">
+            <a:noAutofit/>
+          </a:bodyPr>
+          <a:p>
+            <a:pPr>
+              <a:lnSpc>
+                <a:spcPct val="100000"/>
+              </a:lnSpc>
+              <a:buNone/>
+            </a:pPr>
+            <a:r>
+              <a:rPr b="0" lang="lv-LV" sz="1800" spc="-1" strike="noStrike">
+                <a:latin typeface="Arial"/>
+              </a:rPr>
+              <a:t>• </a:t>
+            </a:r>
+            <a:r>
+              <a:rPr b="0" lang="lv-LV" sz="1800" spc="-1" strike="noStrike">
+                <a:latin typeface="Arial"/>
+              </a:rPr>
+              <a:t>Iekš Terraform moduļa definējam lokālā faila resursu kurā tiek norādīts lai izvada publiskos dns vārdus</a:t>
+            </a:r>
+            <a:endParaRPr b="0" lang="lv-LV" sz="1800" spc="-1" strike="noStrike">
+              <a:latin typeface="Arial"/>
+            </a:endParaRPr>
+          </a:p>
+          <a:p>
+            <a:pPr>
+              <a:lnSpc>
+                <a:spcPct val="100000"/>
+              </a:lnSpc>
+              <a:buNone/>
+            </a:pPr>
+            <a:r>
+              <a:rPr b="0" lang="lv-LV" sz="1800" spc="-1" strike="noStrike">
+                <a:latin typeface="Arial"/>
+              </a:rPr>
+              <a:t>• </a:t>
+            </a:r>
+            <a:r>
+              <a:rPr b="0" lang="lv-LV" sz="1800" spc="-1" strike="noStrike">
+                <a:latin typeface="Arial"/>
+              </a:rPr>
+              <a:t>Publiskie dns vārdi tiek padoti uz hosts.tpl un pēc tā satura tiek izveidots fails – hosts.cfg</a:t>
+            </a:r>
+            <a:endParaRPr b="0" lang="lv-LV" sz="1800" spc="-1" strike="noStrike">
+              <a:latin typeface="Arial"/>
+            </a:endParaRPr>
+          </a:p>
+        </p:txBody>
+      </p:sp>
+      <p:sp>
+        <p:nvSpPr>
+          <p:cNvPr id="288" name=""/>
+          <p:cNvSpPr/>
+          <p:nvPr/>
+        </p:nvSpPr>
+        <p:spPr>
+          <a:xfrm>
+            <a:off x="180000" y="5725800"/>
+            <a:ext cx="5579640" cy="933840"/>
+          </a:xfrm>
+          <a:prstGeom prst="rect">
+            <a:avLst/>
+          </a:prstGeom>
+          <a:noFill/>
+          <a:ln w="0">
+            <a:noFill/>
+          </a:ln>
+        </p:spPr>
+        <p:style>
+          <a:lnRef idx="0"/>
+          <a:fillRef idx="0"/>
+          <a:effectRef idx="0"/>
+          <a:fontRef idx="minor"/>
+        </p:style>
+        <p:txBody>
+          <a:bodyPr lIns="90000" rIns="90000" tIns="45000" bIns="45000" anchor="t">
+            <a:noAutofit/>
+          </a:bodyPr>
+          <a:p>
+            <a:pPr>
+              <a:lnSpc>
+                <a:spcPct val="100000"/>
+              </a:lnSpc>
+              <a:buNone/>
+            </a:pPr>
+            <a:r>
+              <a:rPr b="0" lang="lv-LV" sz="1800" spc="-1" strike="noStrike">
+                <a:latin typeface="Arial"/>
+              </a:rPr>
+              <a:t>* Iespējams arī ģenerēt template, lai tiek aizsūtītas visas moduļu instancu adreses izmantojot “for loop”, automatizētai inventory izveidei</a:t>
+            </a:r>
+            <a:endParaRPr b="0" lang="lv-LV" sz="1800" spc="-1" strike="noStrike">
+              <a:latin typeface="Arial"/>
+            </a:endParaRPr>
+          </a:p>
+        </p:txBody>
+      </p:sp>
+    </p:spTree>
+  </p:cSld>
+  <mc:AlternateContent>
+    <mc:Choice Requires="p14">
+      <p:transition spd="slow" p14:dur="2000"/>
+    </mc:Choice>
+    <mc:Fallback>
+      <p:transition spd="slow"/>
+    </mc:Fallback>
+  </mc:AlternateContent>
+</p:sld>
+</file>
+
+<file path=ppt/slides/slide16.xml><?xml version="1.0" encoding="utf-8"?>
+<p:sld xmlns:a="http://schemas.openxmlformats.org/drawingml/2006/main" xmlns:p="http://schemas.openxmlformats.org/presentationml/2006/main" xmlns:r="http://schemas.openxmlformats.org/officeDocument/2006/relationships" xmlns:p14="http://schemas.microsoft.com/office/powerpoint/2010/main" xmlns:p15="http://schemas.microsoft.com/office/powerpoint/2012/main" xmlns:mc="http://schemas.openxmlformats.org/markup-compatibility/2006">
+  <p:cSld>
+    <p:spTree>
+      <p:nvGrpSpPr>
+        <p:cNvPr id="1" name=""/>
+        <p:cNvGrpSpPr/>
+        <p:nvPr/>
+      </p:nvGrpSpPr>
+      <p:grpSpPr>
+        <a:xfrm>
+          <a:off x="0" y="0"/>
+          <a:ext cx="0" cy="0"/>
+          <a:chOff x="0" y="0"/>
+          <a:chExt cx="0" cy="0"/>
+        </a:xfrm>
+      </p:grpSpPr>
+      <p:sp>
+        <p:nvSpPr>
+          <p:cNvPr id="289" name="PlaceHolder 1"/>
+          <p:cNvSpPr>
+            <a:spLocks noGrp="1"/>
+          </p:cNvSpPr>
+          <p:nvPr>
+            <p:ph type="title"/>
+          </p:nvPr>
+        </p:nvSpPr>
+        <p:spPr>
+          <a:xfrm>
+            <a:off x="609480" y="273600"/>
+            <a:ext cx="10971720" cy="1144080"/>
+          </a:xfrm>
+          <a:prstGeom prst="rect">
+            <a:avLst/>
+          </a:prstGeom>
+          <a:noFill/>
+          <a:ln w="0">
+            <a:noFill/>
+          </a:ln>
+        </p:spPr>
+        <p:txBody>
+          <a:bodyPr lIns="0" rIns="0" tIns="0" bIns="0" anchor="ctr">
+            <a:noAutofit/>
+          </a:bodyPr>
+          <a:p>
+            <a:pPr algn="ctr">
+              <a:lnSpc>
+                <a:spcPct val="100000"/>
+              </a:lnSpc>
+              <a:buNone/>
+            </a:pPr>
+            <a:r>
+              <a:rPr b="0" lang="lv-LV" sz="4400" spc="-1" strike="noStrike">
+                <a:latin typeface="Arial"/>
+              </a:rPr>
+              <a:t>Ansible uzstādīšana caur Terraform </a:t>
+            </a:r>
+            <a:br/>
+            <a:r>
+              <a:rPr b="0" lang="lv-LV" sz="2600" spc="-1" strike="noStrike">
+                <a:latin typeface="Arial"/>
+              </a:rPr>
+              <a:t>(ansible master konfigurēšana)</a:t>
+            </a:r>
+            <a:endParaRPr b="0" lang="lv-LV" sz="2600" spc="-1" strike="noStrike">
+              <a:latin typeface="Arial"/>
+            </a:endParaRPr>
+          </a:p>
+        </p:txBody>
+      </p:sp>
+      <p:pic>
+        <p:nvPicPr>
+          <p:cNvPr id="290" name="" descr=""/>
+          <p:cNvPicPr/>
+          <p:nvPr/>
+        </p:nvPicPr>
+        <p:blipFill>
+          <a:blip r:embed="rId1"/>
+          <a:stretch/>
+        </p:blipFill>
+        <p:spPr>
+          <a:xfrm>
+            <a:off x="4517280" y="3737160"/>
+            <a:ext cx="7362360" cy="2922480"/>
+          </a:xfrm>
+          <a:prstGeom prst="rect">
+            <a:avLst/>
+          </a:prstGeom>
+          <a:ln w="0">
+            <a:noFill/>
+          </a:ln>
+        </p:spPr>
+      </p:pic>
+      <p:pic>
+        <p:nvPicPr>
+          <p:cNvPr id="291" name="" descr=""/>
+          <p:cNvPicPr/>
+          <p:nvPr/>
+        </p:nvPicPr>
+        <p:blipFill>
+          <a:blip r:embed="rId2"/>
+          <a:stretch/>
+        </p:blipFill>
+        <p:spPr>
+          <a:xfrm>
+            <a:off x="8556480" y="1080000"/>
+            <a:ext cx="3143160" cy="3429000"/>
+          </a:xfrm>
+          <a:prstGeom prst="rect">
+            <a:avLst/>
+          </a:prstGeom>
+          <a:ln w="0">
+            <a:noFill/>
+          </a:ln>
+        </p:spPr>
+      </p:pic>
+      <p:sp>
+        <p:nvSpPr>
+          <p:cNvPr id="292" name=""/>
+          <p:cNvSpPr/>
+          <p:nvPr/>
+        </p:nvSpPr>
+        <p:spPr>
+          <a:xfrm>
+            <a:off x="4680000" y="1620000"/>
+            <a:ext cx="3599640" cy="1369800"/>
+          </a:xfrm>
+          <a:prstGeom prst="rect">
+            <a:avLst/>
+          </a:prstGeom>
+          <a:noFill/>
+          <a:ln w="0">
+            <a:noFill/>
+          </a:ln>
+        </p:spPr>
+        <p:style>
+          <a:lnRef idx="0"/>
+          <a:fillRef idx="0"/>
+          <a:effectRef idx="0"/>
+          <a:fontRef idx="minor"/>
+        </p:style>
+        <p:txBody>
+          <a:bodyPr lIns="90000" rIns="90000" tIns="45000" bIns="45000" anchor="t">
+            <a:noAutofit/>
+          </a:bodyPr>
+          <a:p>
+            <a:pPr>
+              <a:lnSpc>
+                <a:spcPct val="100000"/>
+              </a:lnSpc>
+              <a:buNone/>
+            </a:pPr>
+            <a:r>
+              <a:rPr b="0" lang="lv-LV" sz="1800" spc="-1" strike="noStrike">
+                <a:latin typeface="Arial"/>
+              </a:rPr>
+              <a:t>1. Provisioner File caur ssh nosūta privāto atslēgu uz ansible master, node pārvaldīšanai un ģenerēto ansible inventory – hosts.cfg</a:t>
+            </a:r>
+            <a:endParaRPr b="0" lang="lv-LV" sz="1800" spc="-1" strike="noStrike">
+              <a:latin typeface="Arial"/>
+            </a:endParaRPr>
+          </a:p>
+        </p:txBody>
+      </p:sp>
+      <p:sp>
+        <p:nvSpPr>
+          <p:cNvPr id="293" name=""/>
+          <p:cNvSpPr/>
+          <p:nvPr/>
+        </p:nvSpPr>
+        <p:spPr>
+          <a:xfrm>
+            <a:off x="540000" y="4465800"/>
+            <a:ext cx="3599640" cy="2137680"/>
+          </a:xfrm>
+          <a:prstGeom prst="rect">
+            <a:avLst/>
+          </a:prstGeom>
+          <a:noFill/>
+          <a:ln w="0">
+            <a:noFill/>
+          </a:ln>
+        </p:spPr>
+        <p:style>
+          <a:lnRef idx="0"/>
+          <a:fillRef idx="0"/>
+          <a:effectRef idx="0"/>
+          <a:fontRef idx="minor"/>
+        </p:style>
+        <p:txBody>
+          <a:bodyPr lIns="90000" rIns="90000" tIns="45000" bIns="45000" anchor="t">
+            <a:noAutofit/>
+          </a:bodyPr>
+          <a:p>
+            <a:pPr>
+              <a:lnSpc>
+                <a:spcPct val="100000"/>
+              </a:lnSpc>
+              <a:buNone/>
+            </a:pPr>
+            <a:r>
+              <a:rPr b="0" lang="lv-LV" sz="1800" spc="-1" strike="noStrike">
+                <a:latin typeface="Arial"/>
+              </a:rPr>
+              <a:t>2. </a:t>
+            </a:r>
+            <a:endParaRPr b="0" lang="lv-LV" sz="1800" spc="-1" strike="noStrike">
+              <a:latin typeface="Arial"/>
+            </a:endParaRPr>
+          </a:p>
+          <a:p>
+            <a:pPr>
+              <a:lnSpc>
+                <a:spcPct val="100000"/>
+              </a:lnSpc>
+              <a:buNone/>
+            </a:pPr>
+            <a:r>
+              <a:rPr b="0" lang="lv-LV" sz="1800" spc="-1" strike="noStrike">
+                <a:latin typeface="Arial"/>
+              </a:rPr>
+              <a:t>• </a:t>
+            </a:r>
+            <a:r>
+              <a:rPr b="0" lang="lv-LV" sz="1800" spc="-1" strike="noStrike">
+                <a:latin typeface="Arial"/>
+              </a:rPr>
+              <a:t>Uz Ansible Master tiek uzstādītas pareizās tiesības privātajai ssh atslēgai, uzstādīts ansible, pareizi instalēts sagavaotais inventory fails.</a:t>
+            </a:r>
+            <a:endParaRPr b="0" lang="lv-LV" sz="1800" spc="-1" strike="noStrike">
+              <a:latin typeface="Arial"/>
+            </a:endParaRPr>
+          </a:p>
+          <a:p>
+            <a:pPr>
+              <a:lnSpc>
+                <a:spcPct val="100000"/>
+              </a:lnSpc>
+              <a:buNone/>
+            </a:pPr>
+            <a:r>
+              <a:rPr b="0" lang="lv-LV" sz="1800" spc="-1" strike="noStrike">
+                <a:latin typeface="Arial"/>
+              </a:rPr>
+              <a:t>• </a:t>
+            </a:r>
+            <a:r>
+              <a:rPr b="0" lang="lv-LV" sz="1800" spc="-1" strike="noStrike">
+                <a:latin typeface="Arial"/>
+              </a:rPr>
+              <a:t>Tad tiek klonēts repozitorijs un startēti sagatavotie playbooki</a:t>
+            </a:r>
+            <a:endParaRPr b="0" lang="lv-LV" sz="1800" spc="-1" strike="noStrike">
+              <a:latin typeface="Arial"/>
+            </a:endParaRPr>
+          </a:p>
+        </p:txBody>
+      </p:sp>
+    </p:spTree>
+  </p:cSld>
+  <mc:AlternateContent>
+    <mc:Choice Requires="p14">
+      <p:transition spd="slow" p14:dur="2000"/>
+    </mc:Choice>
+    <mc:Fallback>
+      <p:transition spd="slow"/>
+    </mc:Fallback>
+  </mc:AlternateContent>
+</p:sld>
+</file>
+
+<file path=ppt/slides/slide17.xml><?xml version="1.0" encoding="utf-8"?>
+<p:sld xmlns:a="http://schemas.openxmlformats.org/drawingml/2006/main" xmlns:p="http://schemas.openxmlformats.org/presentationml/2006/main" xmlns:r="http://schemas.openxmlformats.org/officeDocument/2006/relationships" xmlns:p14="http://schemas.microsoft.com/office/powerpoint/2010/main" xmlns:p15="http://schemas.microsoft.com/office/powerpoint/2012/main" xmlns:mc="http://schemas.openxmlformats.org/markup-compatibility/2006">
+  <p:cSld>
+    <p:spTree>
+      <p:nvGrpSpPr>
+        <p:cNvPr id="1" name=""/>
+        <p:cNvGrpSpPr/>
+        <p:nvPr/>
+      </p:nvGrpSpPr>
+      <p:grpSpPr>
+        <a:xfrm>
+          <a:off x="0" y="0"/>
+          <a:ext cx="0" cy="0"/>
+          <a:chOff x="0" y="0"/>
+          <a:chExt cx="0" cy="0"/>
+        </a:xfrm>
+      </p:grpSpPr>
+      <p:sp>
+        <p:nvSpPr>
+          <p:cNvPr id="294" name="PlaceHolder 1"/>
+          <p:cNvSpPr>
+            <a:spLocks noGrp="1"/>
+          </p:cNvSpPr>
+          <p:nvPr>
+            <p:ph type="title"/>
+          </p:nvPr>
+        </p:nvSpPr>
+        <p:spPr>
+          <a:xfrm>
+            <a:off x="609480" y="273600"/>
+            <a:ext cx="10971720" cy="1144080"/>
+          </a:xfrm>
+          <a:prstGeom prst="rect">
+            <a:avLst/>
+          </a:prstGeom>
+          <a:noFill/>
+          <a:ln w="0">
+            <a:noFill/>
+          </a:ln>
+        </p:spPr>
+        <p:txBody>
+          <a:bodyPr lIns="0" rIns="0" tIns="0" bIns="0" anchor="ctr">
+            <a:noAutofit/>
+          </a:bodyPr>
+          <a:p>
+            <a:pPr algn="ctr">
+              <a:lnSpc>
+                <a:spcPct val="100000"/>
+              </a:lnSpc>
+              <a:buNone/>
+            </a:pPr>
+            <a:r>
+              <a:rPr b="0" lang="lv-LV" sz="4400" spc="-1" strike="noStrike">
+                <a:latin typeface="Arial"/>
+              </a:rPr>
+              <a:t>Ansible uzstādīšana caur Terraform </a:t>
+            </a:r>
+            <a:br/>
+            <a:r>
+              <a:rPr b="0" lang="lv-LV" sz="2600" spc="-1" strike="noStrike">
+                <a:latin typeface="Arial"/>
+              </a:rPr>
+              <a:t>(ansible host konfigurēšana)</a:t>
+            </a:r>
+            <a:endParaRPr b="0" lang="lv-LV" sz="2600" spc="-1" strike="noStrike">
+              <a:latin typeface="Arial"/>
+            </a:endParaRPr>
+          </a:p>
+        </p:txBody>
+      </p:sp>
+      <p:pic>
+        <p:nvPicPr>
+          <p:cNvPr id="295" name="" descr=""/>
+          <p:cNvPicPr/>
+          <p:nvPr/>
+        </p:nvPicPr>
+        <p:blipFill>
+          <a:blip r:embed="rId1"/>
+          <a:stretch/>
+        </p:blipFill>
+        <p:spPr>
+          <a:xfrm>
+            <a:off x="3960000" y="2046960"/>
+            <a:ext cx="7919640" cy="2738520"/>
+          </a:xfrm>
+          <a:prstGeom prst="rect">
+            <a:avLst/>
+          </a:prstGeom>
+          <a:ln w="0">
+            <a:noFill/>
+          </a:ln>
+        </p:spPr>
+      </p:pic>
+      <p:sp>
+        <p:nvSpPr>
+          <p:cNvPr id="296" name=""/>
+          <p:cNvSpPr/>
+          <p:nvPr/>
+        </p:nvSpPr>
+        <p:spPr>
+          <a:xfrm>
+            <a:off x="900000" y="2125800"/>
+            <a:ext cx="2705760" cy="1369800"/>
+          </a:xfrm>
+          <a:prstGeom prst="rect">
+            <a:avLst/>
+          </a:prstGeom>
+          <a:noFill/>
+          <a:ln w="0">
+            <a:noFill/>
+          </a:ln>
+        </p:spPr>
+        <p:style>
+          <a:lnRef idx="0"/>
+          <a:fillRef idx="0"/>
+          <a:effectRef idx="0"/>
+          <a:fontRef idx="minor"/>
+        </p:style>
+        <p:txBody>
+          <a:bodyPr lIns="90000" rIns="90000" tIns="45000" bIns="45000" anchor="t">
+            <a:noAutofit/>
+          </a:bodyPr>
+          <a:p>
+            <a:pPr>
+              <a:lnSpc>
+                <a:spcPct val="100000"/>
+              </a:lnSpc>
+              <a:buNone/>
+            </a:pPr>
+            <a:r>
+              <a:rPr b="0" lang="lv-LV" sz="1800" spc="-1" strike="noStrike">
+                <a:latin typeface="Arial"/>
+              </a:rPr>
+              <a:t>• </a:t>
+            </a:r>
+            <a:r>
+              <a:rPr b="0" lang="lv-LV" sz="1800" spc="-1" strike="noStrike">
+                <a:latin typeface="Arial"/>
+              </a:rPr>
+              <a:t>Izmantojot remote-exec inline komandu ielasa ssh public key un ievada to iekš authorized keys ansible hostos</a:t>
+            </a:r>
+            <a:endParaRPr b="0" lang="lv-LV" sz="1800" spc="-1" strike="noStrike">
+              <a:latin typeface="Arial"/>
+            </a:endParaRPr>
+          </a:p>
+        </p:txBody>
+      </p:sp>
+    </p:spTree>
+  </p:cSld>
+  <mc:AlternateContent>
+    <mc:Choice Requires="p14">
+      <p:transition spd="slow" p14:dur="2000"/>
+    </mc:Choice>
+    <mc:Fallback>
+      <p:transition spd="slow"/>
+    </mc:Fallback>
+  </mc:AlternateContent>
+</p:sld>
+</file>
+
+<file path=ppt/slides/slide18.xml><?xml version="1.0" encoding="utf-8"?>
+<p:sld xmlns:a="http://schemas.openxmlformats.org/drawingml/2006/main" xmlns:p="http://schemas.openxmlformats.org/presentationml/2006/main" xmlns:r="http://schemas.openxmlformats.org/officeDocument/2006/relationships" xmlns:p14="http://schemas.microsoft.com/office/powerpoint/2010/main" xmlns:p15="http://schemas.microsoft.com/office/powerpoint/2012/main" xmlns:mc="http://schemas.openxmlformats.org/markup-compatibility/2006">
+  <p:cSld>
+    <p:spTree>
+      <p:nvGrpSpPr>
+        <p:cNvPr id="1" name=""/>
+        <p:cNvGrpSpPr/>
+        <p:nvPr/>
+      </p:nvGrpSpPr>
+      <p:grpSpPr>
+        <a:xfrm>
+          <a:off x="0" y="0"/>
+          <a:ext cx="0" cy="0"/>
+          <a:chOff x="0" y="0"/>
+          <a:chExt cx="0" cy="0"/>
+        </a:xfrm>
+      </p:grpSpPr>
+      <p:sp>
+        <p:nvSpPr>
+          <p:cNvPr id="297" name="PlaceHolder 1"/>
+          <p:cNvSpPr>
+            <a:spLocks noGrp="1"/>
+          </p:cNvSpPr>
+          <p:nvPr>
+            <p:ph type="title"/>
+          </p:nvPr>
+        </p:nvSpPr>
+        <p:spPr>
+          <a:xfrm>
+            <a:off x="609480" y="36000"/>
+            <a:ext cx="10971720" cy="1618920"/>
+          </a:xfrm>
+          <a:prstGeom prst="rect">
+            <a:avLst/>
+          </a:prstGeom>
+          <a:noFill/>
+          <a:ln w="0">
+            <a:noFill/>
+          </a:ln>
+        </p:spPr>
+        <p:txBody>
+          <a:bodyPr lIns="0" rIns="0" tIns="0" bIns="0" anchor="ctr">
+            <a:noAutofit/>
+          </a:bodyPr>
+          <a:p>
+            <a:pPr algn="ctr">
+              <a:lnSpc>
+                <a:spcPct val="100000"/>
+              </a:lnSpc>
+              <a:buNone/>
+            </a:pPr>
+            <a:r>
+              <a:rPr b="0" lang="lv-LV" sz="4400" spc="-1" strike="noStrike">
+                <a:latin typeface="Arial"/>
+              </a:rPr>
+              <a:t>Instanču uzstādīšana un konfigurēšana caur Ansible</a:t>
+            </a:r>
+            <a:br/>
+            <a:r>
+              <a:rPr b="0" lang="lv-LV" sz="2600" spc="-1" strike="noStrike">
+                <a:latin typeface="Arial"/>
+              </a:rPr>
+              <a:t>(ansible master Apache2 un php uzstādīšana)</a:t>
+            </a:r>
+            <a:endParaRPr b="0" lang="lv-LV" sz="2600" spc="-1" strike="noStrike">
+              <a:latin typeface="Arial"/>
+            </a:endParaRPr>
+          </a:p>
+        </p:txBody>
+      </p:sp>
+      <p:pic>
+        <p:nvPicPr>
+          <p:cNvPr id="298" name="" descr=""/>
+          <p:cNvPicPr/>
+          <p:nvPr/>
+        </p:nvPicPr>
+        <p:blipFill>
+          <a:blip r:embed="rId1"/>
+          <a:stretch/>
+        </p:blipFill>
+        <p:spPr>
+          <a:xfrm>
+            <a:off x="6944400" y="1655280"/>
+            <a:ext cx="4395240" cy="4802760"/>
+          </a:xfrm>
+          <a:prstGeom prst="rect">
+            <a:avLst/>
+          </a:prstGeom>
+          <a:ln w="0">
+            <a:noFill/>
+          </a:ln>
+        </p:spPr>
+      </p:pic>
+      <p:sp>
+        <p:nvSpPr>
+          <p:cNvPr id="299" name=""/>
+          <p:cNvSpPr/>
+          <p:nvPr/>
+        </p:nvSpPr>
+        <p:spPr>
+          <a:xfrm>
+            <a:off x="720000" y="2340000"/>
+            <a:ext cx="6224040" cy="899640"/>
+          </a:xfrm>
+          <a:prstGeom prst="rect">
+            <a:avLst/>
+          </a:prstGeom>
+          <a:noFill/>
+          <a:ln w="0">
+            <a:noFill/>
+          </a:ln>
+        </p:spPr>
+        <p:style>
+          <a:lnRef idx="0"/>
+          <a:fillRef idx="0"/>
+          <a:effectRef idx="0"/>
+          <a:fontRef idx="minor"/>
+        </p:style>
+        <p:txBody>
+          <a:bodyPr lIns="90000" rIns="90000" tIns="45000" bIns="45000" anchor="t">
+            <a:noAutofit/>
+          </a:bodyPr>
+          <a:p>
+            <a:pPr>
+              <a:lnSpc>
+                <a:spcPct val="100000"/>
+              </a:lnSpc>
+              <a:buNone/>
+            </a:pPr>
+            <a:r>
+              <a:rPr b="0" lang="lv-LV" sz="1800" spc="-1" strike="noStrike">
+                <a:latin typeface="Arial"/>
+              </a:rPr>
+              <a:t>• </a:t>
+            </a:r>
+            <a:r>
+              <a:rPr b="0" lang="lv-LV" sz="1800" spc="-1" strike="noStrike">
+                <a:latin typeface="Arial"/>
+              </a:rPr>
+              <a:t>Norādīts hosts – localhost, lai izpildītos uz ansible master</a:t>
+            </a:r>
+            <a:endParaRPr b="0" lang="lv-LV" sz="1800" spc="-1" strike="noStrike">
+              <a:latin typeface="Arial"/>
+            </a:endParaRPr>
+          </a:p>
+          <a:p>
+            <a:pPr>
+              <a:lnSpc>
+                <a:spcPct val="100000"/>
+              </a:lnSpc>
+              <a:buNone/>
+            </a:pPr>
+            <a:r>
+              <a:rPr b="0" lang="lv-LV" sz="1800" spc="-1" strike="noStrike">
+                <a:latin typeface="Arial"/>
+              </a:rPr>
+              <a:t>• </a:t>
+            </a:r>
+            <a:r>
+              <a:rPr b="0" lang="lv-LV" sz="1800" spc="-1" strike="noStrike">
+                <a:latin typeface="Arial"/>
+              </a:rPr>
+              <a:t>Uzstāda apache2 un php uz master node</a:t>
+            </a:r>
+            <a:endParaRPr b="0" lang="lv-LV" sz="1800" spc="-1" strike="noStrike">
+              <a:latin typeface="Arial"/>
+            </a:endParaRPr>
+          </a:p>
+        </p:txBody>
+      </p:sp>
+    </p:spTree>
+  </p:cSld>
+  <mc:AlternateContent>
+    <mc:Choice Requires="p14">
+      <p:transition spd="slow" p14:dur="2000"/>
+    </mc:Choice>
+    <mc:Fallback>
+      <p:transition spd="slow"/>
+    </mc:Fallback>
+  </mc:AlternateContent>
+</p:sld>
+</file>
+
+<file path=ppt/slides/slide19.xml><?xml version="1.0" encoding="utf-8"?>
+<p:sld xmlns:a="http://schemas.openxmlformats.org/drawingml/2006/main" xmlns:p="http://schemas.openxmlformats.org/presentationml/2006/main" xmlns:r="http://schemas.openxmlformats.org/officeDocument/2006/relationships" xmlns:p14="http://schemas.microsoft.com/office/powerpoint/2010/main" xmlns:p15="http://schemas.microsoft.com/office/powerpoint/2012/main" xmlns:mc="http://schemas.openxmlformats.org/markup-compatibility/2006">
+  <p:cSld>
+    <p:spTree>
+      <p:nvGrpSpPr>
+        <p:cNvPr id="1" name=""/>
+        <p:cNvGrpSpPr/>
+        <p:nvPr/>
+      </p:nvGrpSpPr>
+      <p:grpSpPr>
+        <a:xfrm>
+          <a:off x="0" y="0"/>
+          <a:ext cx="0" cy="0"/>
+          <a:chOff x="0" y="0"/>
+          <a:chExt cx="0" cy="0"/>
+        </a:xfrm>
+      </p:grpSpPr>
+      <p:sp>
+        <p:nvSpPr>
+          <p:cNvPr id="300" name="PlaceHolder 1"/>
+          <p:cNvSpPr>
+            <a:spLocks noGrp="1"/>
+          </p:cNvSpPr>
+          <p:nvPr>
+            <p:ph type="title"/>
+          </p:nvPr>
+        </p:nvSpPr>
+        <p:spPr>
+          <a:xfrm>
+            <a:off x="609480" y="50760"/>
+            <a:ext cx="10971720" cy="1589760"/>
+          </a:xfrm>
+          <a:prstGeom prst="rect">
+            <a:avLst/>
+          </a:prstGeom>
+          <a:noFill/>
+          <a:ln w="0">
+            <a:noFill/>
+          </a:ln>
+        </p:spPr>
+        <p:txBody>
+          <a:bodyPr lIns="0" rIns="0" tIns="0" bIns="0" anchor="ctr">
+            <a:noAutofit/>
+          </a:bodyPr>
+          <a:p>
+            <a:pPr algn="ctr">
+              <a:lnSpc>
+                <a:spcPct val="100000"/>
+              </a:lnSpc>
+              <a:buNone/>
+            </a:pPr>
+            <a:r>
+              <a:rPr b="0" lang="lv-LV" sz="4400" spc="-1" strike="noStrike">
+                <a:latin typeface="Arial"/>
+              </a:rPr>
+              <a:t>Instanču uzstādīšana un konfigurēšana caur Ansible</a:t>
+            </a:r>
+            <a:br/>
+            <a:r>
+              <a:rPr b="0" lang="lv-LV" sz="2400" spc="-1" strike="noStrike">
+                <a:latin typeface="Arial"/>
+              </a:rPr>
+              <a:t>(ansible node Apache Cassandra uzstādīšana ar dependencies un java test)</a:t>
+            </a:r>
+            <a:endParaRPr b="0" lang="lv-LV" sz="2400" spc="-1" strike="noStrike">
+              <a:latin typeface="Arial"/>
+            </a:endParaRPr>
+          </a:p>
+        </p:txBody>
+      </p:sp>
+      <p:pic>
+        <p:nvPicPr>
+          <p:cNvPr id="301" name="" descr=""/>
+          <p:cNvPicPr/>
+          <p:nvPr/>
+        </p:nvPicPr>
+        <p:blipFill>
+          <a:blip r:embed="rId1"/>
+          <a:stretch/>
+        </p:blipFill>
+        <p:spPr>
+          <a:xfrm>
+            <a:off x="3547800" y="1866240"/>
+            <a:ext cx="4105440" cy="3353400"/>
+          </a:xfrm>
+          <a:prstGeom prst="rect">
+            <a:avLst/>
+          </a:prstGeom>
+          <a:ln w="0">
+            <a:noFill/>
+          </a:ln>
+        </p:spPr>
+      </p:pic>
+      <p:pic>
+        <p:nvPicPr>
+          <p:cNvPr id="302" name="" descr=""/>
+          <p:cNvPicPr/>
+          <p:nvPr/>
+        </p:nvPicPr>
+        <p:blipFill>
+          <a:blip r:embed="rId2"/>
+          <a:stretch/>
+        </p:blipFill>
+        <p:spPr>
+          <a:xfrm>
+            <a:off x="7653600" y="1866240"/>
+            <a:ext cx="4226040" cy="3353400"/>
+          </a:xfrm>
+          <a:prstGeom prst="rect">
+            <a:avLst/>
+          </a:prstGeom>
+          <a:ln w="0">
+            <a:noFill/>
+          </a:ln>
+        </p:spPr>
+      </p:pic>
+      <p:sp>
+        <p:nvSpPr>
+          <p:cNvPr id="303" name=""/>
+          <p:cNvSpPr/>
+          <p:nvPr/>
+        </p:nvSpPr>
+        <p:spPr>
+          <a:xfrm>
+            <a:off x="720000" y="1980000"/>
+            <a:ext cx="2699640" cy="2649600"/>
+          </a:xfrm>
+          <a:prstGeom prst="rect">
+            <a:avLst/>
+          </a:prstGeom>
+          <a:noFill/>
+          <a:ln w="0">
+            <a:noFill/>
+          </a:ln>
+        </p:spPr>
+        <p:style>
+          <a:lnRef idx="0"/>
+          <a:fillRef idx="0"/>
+          <a:effectRef idx="0"/>
+          <a:fontRef idx="minor"/>
+        </p:style>
+        <p:txBody>
+          <a:bodyPr lIns="90000" rIns="90000" tIns="45000" bIns="45000" anchor="t">
+            <a:noAutofit/>
+          </a:bodyPr>
+          <a:p>
+            <a:pPr>
+              <a:lnSpc>
+                <a:spcPct val="100000"/>
+              </a:lnSpc>
+              <a:buNone/>
+            </a:pPr>
+            <a:r>
+              <a:rPr b="0" lang="lv-LV" sz="1800" spc="-1" strike="noStrike">
+                <a:latin typeface="Arial"/>
+              </a:rPr>
+              <a:t>• </a:t>
+            </a:r>
+            <a:r>
+              <a:rPr b="0" lang="lv-LV" sz="1800" spc="-1" strike="noStrike">
+                <a:latin typeface="Arial"/>
+              </a:rPr>
+              <a:t>Uzstāda nepieciešamās apt pakas</a:t>
+            </a:r>
+            <a:endParaRPr b="0" lang="lv-LV" sz="1800" spc="-1" strike="noStrike">
+              <a:latin typeface="Arial"/>
+            </a:endParaRPr>
+          </a:p>
+          <a:p>
+            <a:pPr>
+              <a:lnSpc>
+                <a:spcPct val="100000"/>
+              </a:lnSpc>
+              <a:buNone/>
+            </a:pPr>
+            <a:r>
+              <a:rPr b="0" lang="lv-LV" sz="1800" spc="-1" strike="noStrike">
+                <a:latin typeface="Arial"/>
+              </a:rPr>
+              <a:t>• </a:t>
+            </a:r>
+            <a:r>
+              <a:rPr b="0" lang="lv-LV" sz="1800" spc="-1" strike="noStrike">
+                <a:latin typeface="Arial"/>
+              </a:rPr>
+              <a:t>Instalē php atslēgas priekš Cassandra repozitorija</a:t>
+            </a:r>
+            <a:endParaRPr b="0" lang="lv-LV" sz="1800" spc="-1" strike="noStrike">
+              <a:latin typeface="Arial"/>
+            </a:endParaRPr>
+          </a:p>
+          <a:p>
+            <a:pPr>
+              <a:lnSpc>
+                <a:spcPct val="100000"/>
+              </a:lnSpc>
+              <a:buNone/>
+            </a:pPr>
+            <a:r>
+              <a:rPr b="0" lang="lv-LV" sz="1800" spc="-1" strike="noStrike">
+                <a:latin typeface="Arial"/>
+              </a:rPr>
+              <a:t>• </a:t>
+            </a:r>
+            <a:r>
+              <a:rPr b="0" lang="lv-LV" sz="1800" spc="-1" strike="noStrike">
+                <a:latin typeface="Arial"/>
+              </a:rPr>
+              <a:t>Uzstāda Cassandru</a:t>
+            </a:r>
+            <a:endParaRPr b="0" lang="lv-LV" sz="1800" spc="-1" strike="noStrike">
+              <a:latin typeface="Arial"/>
+            </a:endParaRPr>
+          </a:p>
+          <a:p>
+            <a:pPr>
+              <a:lnSpc>
+                <a:spcPct val="100000"/>
+              </a:lnSpc>
+              <a:buNone/>
+            </a:pPr>
+            <a:r>
+              <a:rPr b="0" lang="lv-LV" sz="1800" spc="-1" strike="noStrike">
+                <a:latin typeface="Arial"/>
+              </a:rPr>
+              <a:t>• </a:t>
+            </a:r>
+            <a:r>
+              <a:rPr b="0" lang="lv-LV" sz="1800" spc="-1" strike="noStrike">
+                <a:latin typeface="Arial"/>
+              </a:rPr>
+              <a:t>Iestata env mainīgo JAVA_HOME un to pārbauda</a:t>
+            </a:r>
+            <a:endParaRPr b="0" lang="lv-LV" sz="1800" spc="-1" strike="noStrike">
               <a:latin typeface="Arial"/>
             </a:endParaRPr>
           </a:p>
@@ -30363,7 +32103,7 @@
         <p:spPr>
           <a:xfrm>
             <a:off x="1024200" y="585360"/>
-            <a:ext cx="9719280" cy="1499040"/>
+            <a:ext cx="9718560" cy="1498320"/>
           </a:xfrm>
           <a:prstGeom prst="rect">
             <a:avLst/>
@@ -30385,7 +32125,7 @@
               <a:buNone/>
             </a:pPr>
             <a:r>
-              <a:rPr b="0" lang="lv-LV" sz="5000" spc="94" strike="noStrike" cap="all">
+              <a:rPr b="0" lang="lv-LV" sz="5000" spc="89" strike="noStrike" cap="all">
                 <a:solidFill>
                   <a:srgbClr val="0d0d0d"/>
                 </a:solidFill>
@@ -30412,7 +32152,7 @@
         <p:spPr>
           <a:xfrm>
             <a:off x="1024200" y="2286000"/>
-            <a:ext cx="9719280" cy="4022640"/>
+            <a:ext cx="9718560" cy="4021920"/>
           </a:xfrm>
           <a:prstGeom prst="rect">
             <a:avLst/>
@@ -30723,6 +32463,581 @@
               <a:t>Izmēģināt GitLab Runner / Github actions</a:t>
             </a:r>
             <a:endParaRPr b="0" lang="lv-LV" sz="1400" spc="-1" strike="noStrike">
+              <a:latin typeface="Arial"/>
+            </a:endParaRPr>
+          </a:p>
+        </p:txBody>
+      </p:sp>
+    </p:spTree>
+  </p:cSld>
+  <mc:AlternateContent>
+    <mc:Choice Requires="p14">
+      <p:transition spd="slow" p14:dur="2000"/>
+    </mc:Choice>
+    <mc:Fallback>
+      <p:transition spd="slow"/>
+    </mc:Fallback>
+  </mc:AlternateContent>
+</p:sld>
+</file>
+
+<file path=ppt/slides/slide20.xml><?xml version="1.0" encoding="utf-8"?>
+<p:sld xmlns:a="http://schemas.openxmlformats.org/drawingml/2006/main" xmlns:p="http://schemas.openxmlformats.org/presentationml/2006/main" xmlns:r="http://schemas.openxmlformats.org/officeDocument/2006/relationships" xmlns:p14="http://schemas.microsoft.com/office/powerpoint/2010/main" xmlns:p15="http://schemas.microsoft.com/office/powerpoint/2012/main" xmlns:mc="http://schemas.openxmlformats.org/markup-compatibility/2006">
+  <p:cSld>
+    <p:spTree>
+      <p:nvGrpSpPr>
+        <p:cNvPr id="1" name=""/>
+        <p:cNvGrpSpPr/>
+        <p:nvPr/>
+      </p:nvGrpSpPr>
+      <p:grpSpPr>
+        <a:xfrm>
+          <a:off x="0" y="0"/>
+          <a:ext cx="0" cy="0"/>
+          <a:chOff x="0" y="0"/>
+          <a:chExt cx="0" cy="0"/>
+        </a:xfrm>
+      </p:grpSpPr>
+      <p:sp>
+        <p:nvSpPr>
+          <p:cNvPr id="304" name="PlaceHolder 1"/>
+          <p:cNvSpPr>
+            <a:spLocks noGrp="1"/>
+          </p:cNvSpPr>
+          <p:nvPr>
+            <p:ph type="title"/>
+          </p:nvPr>
+        </p:nvSpPr>
+        <p:spPr>
+          <a:xfrm>
+            <a:off x="609480" y="50760"/>
+            <a:ext cx="10971720" cy="1589760"/>
+          </a:xfrm>
+          <a:prstGeom prst="rect">
+            <a:avLst/>
+          </a:prstGeom>
+          <a:noFill/>
+          <a:ln w="0">
+            <a:noFill/>
+          </a:ln>
+        </p:spPr>
+        <p:txBody>
+          <a:bodyPr lIns="0" rIns="0" tIns="0" bIns="0" anchor="ctr">
+            <a:noAutofit/>
+          </a:bodyPr>
+          <a:p>
+            <a:pPr algn="ctr">
+              <a:lnSpc>
+                <a:spcPct val="100000"/>
+              </a:lnSpc>
+              <a:buNone/>
+            </a:pPr>
+            <a:r>
+              <a:rPr b="0" lang="lv-LV" sz="4400" spc="-1" strike="noStrike">
+                <a:latin typeface="Arial"/>
+              </a:rPr>
+              <a:t>Instanču uzstādīšana un konfigurēšana caur Ansible</a:t>
+            </a:r>
+            <a:br/>
+            <a:r>
+              <a:rPr b="0" lang="lv-LV" sz="2400" spc="-1" strike="noStrike">
+                <a:latin typeface="Arial"/>
+              </a:rPr>
+              <a:t>(ansible datu lejupielāde un imports iekš main node)</a:t>
+            </a:r>
+            <a:endParaRPr b="0" lang="lv-LV" sz="2400" spc="-1" strike="noStrike">
+              <a:latin typeface="Arial"/>
+            </a:endParaRPr>
+          </a:p>
+        </p:txBody>
+      </p:sp>
+      <p:pic>
+        <p:nvPicPr>
+          <p:cNvPr id="305" name="" descr=""/>
+          <p:cNvPicPr/>
+          <p:nvPr/>
+        </p:nvPicPr>
+        <p:blipFill>
+          <a:blip r:embed="rId1"/>
+          <a:stretch/>
+        </p:blipFill>
+        <p:spPr>
+          <a:xfrm>
+            <a:off x="4140000" y="1800000"/>
+            <a:ext cx="7632000" cy="4337280"/>
+          </a:xfrm>
+          <a:prstGeom prst="rect">
+            <a:avLst/>
+          </a:prstGeom>
+          <a:ln w="0">
+            <a:noFill/>
+          </a:ln>
+        </p:spPr>
+      </p:pic>
+      <p:sp>
+        <p:nvSpPr>
+          <p:cNvPr id="306" name=""/>
+          <p:cNvSpPr/>
+          <p:nvPr/>
+        </p:nvSpPr>
+        <p:spPr>
+          <a:xfrm>
+            <a:off x="540000" y="1980000"/>
+            <a:ext cx="3239640" cy="2137680"/>
+          </a:xfrm>
+          <a:prstGeom prst="rect">
+            <a:avLst/>
+          </a:prstGeom>
+          <a:noFill/>
+          <a:ln w="0">
+            <a:noFill/>
+          </a:ln>
+        </p:spPr>
+        <p:style>
+          <a:lnRef idx="0"/>
+          <a:fillRef idx="0"/>
+          <a:effectRef idx="0"/>
+          <a:fontRef idx="minor"/>
+        </p:style>
+        <p:txBody>
+          <a:bodyPr lIns="90000" rIns="90000" tIns="45000" bIns="45000" anchor="t">
+            <a:noAutofit/>
+          </a:bodyPr>
+          <a:p>
+            <a:pPr>
+              <a:lnSpc>
+                <a:spcPct val="100000"/>
+              </a:lnSpc>
+              <a:buNone/>
+            </a:pPr>
+            <a:r>
+              <a:rPr b="0" lang="lv-LV" sz="1800" spc="-1" strike="noStrike">
+                <a:latin typeface="Arial"/>
+              </a:rPr>
+              <a:t>• </a:t>
+            </a:r>
+            <a:r>
+              <a:rPr b="0" lang="lv-LV" sz="1800" spc="-1" strike="noStrike">
+                <a:latin typeface="Arial"/>
+              </a:rPr>
+              <a:t>Izveido directory datu saglabāšanai</a:t>
+            </a:r>
+            <a:endParaRPr b="0" lang="lv-LV" sz="1800" spc="-1" strike="noStrike">
+              <a:latin typeface="Arial"/>
+            </a:endParaRPr>
+          </a:p>
+          <a:p>
+            <a:pPr>
+              <a:lnSpc>
+                <a:spcPct val="100000"/>
+              </a:lnSpc>
+              <a:buNone/>
+            </a:pPr>
+            <a:r>
+              <a:rPr b="0" lang="lv-LV" sz="1800" spc="-1" strike="noStrike">
+                <a:latin typeface="Arial"/>
+              </a:rPr>
+              <a:t>• </a:t>
+            </a:r>
+            <a:r>
+              <a:rPr b="0" lang="lv-LV" sz="1800" spc="-1" strike="noStrike">
+                <a:latin typeface="Arial"/>
+              </a:rPr>
+              <a:t>Lejupielādē Github repo uz cassandra nodes</a:t>
+            </a:r>
+            <a:endParaRPr b="0" lang="lv-LV" sz="1800" spc="-1" strike="noStrike">
+              <a:latin typeface="Arial"/>
+            </a:endParaRPr>
+          </a:p>
+          <a:p>
+            <a:pPr>
+              <a:lnSpc>
+                <a:spcPct val="100000"/>
+              </a:lnSpc>
+              <a:buNone/>
+            </a:pPr>
+            <a:r>
+              <a:rPr b="0" lang="lv-LV" sz="1800" spc="-1" strike="noStrike">
+                <a:latin typeface="Arial"/>
+              </a:rPr>
+              <a:t>• </a:t>
+            </a:r>
+            <a:r>
+              <a:rPr b="0" lang="lv-LV" sz="1800" spc="-1" strike="noStrike">
+                <a:latin typeface="Arial"/>
+              </a:rPr>
+              <a:t>No lejupielādētajiem datiem palaiž sagatavotos skriptus datu lejupielādei un importēšanai</a:t>
+            </a:r>
+            <a:endParaRPr b="0" lang="lv-LV" sz="1800" spc="-1" strike="noStrike">
+              <a:latin typeface="Arial"/>
+            </a:endParaRPr>
+          </a:p>
+        </p:txBody>
+      </p:sp>
+    </p:spTree>
+  </p:cSld>
+  <mc:AlternateContent>
+    <mc:Choice Requires="p14">
+      <p:transition spd="slow" p14:dur="2000"/>
+    </mc:Choice>
+    <mc:Fallback>
+      <p:transition spd="slow"/>
+    </mc:Fallback>
+  </mc:AlternateContent>
+</p:sld>
+</file>
+
+<file path=ppt/slides/slide21.xml><?xml version="1.0" encoding="utf-8"?>
+<p:sld xmlns:a="http://schemas.openxmlformats.org/drawingml/2006/main" xmlns:p="http://schemas.openxmlformats.org/presentationml/2006/main" xmlns:r="http://schemas.openxmlformats.org/officeDocument/2006/relationships" xmlns:p14="http://schemas.microsoft.com/office/powerpoint/2010/main" xmlns:p15="http://schemas.microsoft.com/office/powerpoint/2012/main" xmlns:mc="http://schemas.openxmlformats.org/markup-compatibility/2006">
+  <p:cSld>
+    <p:spTree>
+      <p:nvGrpSpPr>
+        <p:cNvPr id="1" name=""/>
+        <p:cNvGrpSpPr/>
+        <p:nvPr/>
+      </p:nvGrpSpPr>
+      <p:grpSpPr>
+        <a:xfrm>
+          <a:off x="0" y="0"/>
+          <a:ext cx="0" cy="0"/>
+          <a:chOff x="0" y="0"/>
+          <a:chExt cx="0" cy="0"/>
+        </a:xfrm>
+      </p:grpSpPr>
+      <p:sp>
+        <p:nvSpPr>
+          <p:cNvPr id="307" name="PlaceHolder 1"/>
+          <p:cNvSpPr>
+            <a:spLocks noGrp="1"/>
+          </p:cNvSpPr>
+          <p:nvPr>
+            <p:ph type="title"/>
+          </p:nvPr>
+        </p:nvSpPr>
+        <p:spPr>
+          <a:xfrm>
+            <a:off x="609480" y="273600"/>
+            <a:ext cx="10971720" cy="1144080"/>
+          </a:xfrm>
+          <a:prstGeom prst="rect">
+            <a:avLst/>
+          </a:prstGeom>
+          <a:noFill/>
+          <a:ln w="0">
+            <a:noFill/>
+          </a:ln>
+        </p:spPr>
+        <p:txBody>
+          <a:bodyPr lIns="0" rIns="0" tIns="0" bIns="0" anchor="ctr">
+            <a:noAutofit/>
+          </a:bodyPr>
+          <a:p>
+            <a:pPr algn="ctr">
+              <a:lnSpc>
+                <a:spcPct val="100000"/>
+              </a:lnSpc>
+              <a:buNone/>
+            </a:pPr>
+            <a:r>
+              <a:rPr b="0" lang="lv-LV" sz="4400" spc="-1" strike="noStrike">
+                <a:latin typeface="Arial"/>
+              </a:rPr>
+              <a:t>Rezultāts pēc Terraform apply</a:t>
+            </a:r>
+            <a:endParaRPr b="0" lang="lv-LV" sz="4400" spc="-1" strike="noStrike">
+              <a:latin typeface="Arial"/>
+            </a:endParaRPr>
+          </a:p>
+        </p:txBody>
+      </p:sp>
+      <p:pic>
+        <p:nvPicPr>
+          <p:cNvPr id="308" name="" descr=""/>
+          <p:cNvPicPr/>
+          <p:nvPr/>
+        </p:nvPicPr>
+        <p:blipFill>
+          <a:blip r:embed="rId1"/>
+          <a:stretch/>
+        </p:blipFill>
+        <p:spPr>
+          <a:xfrm>
+            <a:off x="360000" y="2700000"/>
+            <a:ext cx="5759640" cy="3462120"/>
+          </a:xfrm>
+          <a:prstGeom prst="rect">
+            <a:avLst/>
+          </a:prstGeom>
+          <a:ln w="0">
+            <a:noFill/>
+          </a:ln>
+        </p:spPr>
+      </p:pic>
+      <p:pic>
+        <p:nvPicPr>
+          <p:cNvPr id="309" name="" descr=""/>
+          <p:cNvPicPr/>
+          <p:nvPr/>
+        </p:nvPicPr>
+        <p:blipFill>
+          <a:blip r:embed="rId2"/>
+          <a:stretch/>
+        </p:blipFill>
+        <p:spPr>
+          <a:xfrm>
+            <a:off x="6272280" y="2700000"/>
+            <a:ext cx="5607360" cy="3419640"/>
+          </a:xfrm>
+          <a:prstGeom prst="rect">
+            <a:avLst/>
+          </a:prstGeom>
+          <a:ln w="0">
+            <a:noFill/>
+          </a:ln>
+        </p:spPr>
+      </p:pic>
+      <p:sp>
+        <p:nvSpPr>
+          <p:cNvPr id="310" name=""/>
+          <p:cNvSpPr/>
+          <p:nvPr/>
+        </p:nvSpPr>
+        <p:spPr>
+          <a:xfrm>
+            <a:off x="609480" y="1440000"/>
+            <a:ext cx="10550160" cy="1423800"/>
+          </a:xfrm>
+          <a:prstGeom prst="rect">
+            <a:avLst/>
+          </a:prstGeom>
+          <a:noFill/>
+          <a:ln w="0">
+            <a:noFill/>
+          </a:ln>
+        </p:spPr>
+        <p:style>
+          <a:lnRef idx="0"/>
+          <a:fillRef idx="0"/>
+          <a:effectRef idx="0"/>
+          <a:fontRef idx="minor"/>
+        </p:style>
+        <p:txBody>
+          <a:bodyPr lIns="90000" rIns="90000" tIns="45000" bIns="45000" anchor="t">
+            <a:noAutofit/>
+          </a:bodyPr>
+          <a:p>
+            <a:pPr>
+              <a:lnSpc>
+                <a:spcPct val="100000"/>
+              </a:lnSpc>
+              <a:buNone/>
+            </a:pPr>
+            <a:r>
+              <a:rPr b="0" lang="lv-LV" sz="1800" spc="-1" strike="noStrike">
+                <a:latin typeface="Arial"/>
+              </a:rPr>
+              <a:t>• </a:t>
+            </a:r>
+            <a:r>
+              <a:rPr b="0" lang="lv-LV" sz="1800" spc="-1" strike="noStrike">
+                <a:latin typeface="Arial"/>
+              </a:rPr>
+              <a:t>Pilns Terraform apply aizņem 10min un 3sek, no kuram 5m ir datu lejupielāde no UR</a:t>
+            </a:r>
+            <a:endParaRPr b="0" lang="lv-LV" sz="1800" spc="-1" strike="noStrike">
+              <a:latin typeface="Arial"/>
+            </a:endParaRPr>
+          </a:p>
+          <a:p>
+            <a:pPr>
+              <a:lnSpc>
+                <a:spcPct val="100000"/>
+              </a:lnSpc>
+              <a:buNone/>
+            </a:pPr>
+            <a:r>
+              <a:rPr b="0" lang="lv-LV" sz="1800" spc="-1" strike="noStrike">
+                <a:latin typeface="Arial"/>
+              </a:rPr>
+              <a:t>• </a:t>
+            </a:r>
+            <a:r>
+              <a:rPr b="0" lang="lv-LV" sz="1800" spc="-1" strike="noStrike">
+                <a:latin typeface="Arial"/>
+              </a:rPr>
+              <a:t>Terraform automatizēti uzstāda ansible struktūru un apmaina ssh keys starp hostiem</a:t>
+            </a:r>
+            <a:endParaRPr b="0" lang="lv-LV" sz="1800" spc="-1" strike="noStrike">
+              <a:latin typeface="Arial"/>
+            </a:endParaRPr>
+          </a:p>
+          <a:p>
+            <a:pPr>
+              <a:lnSpc>
+                <a:spcPct val="100000"/>
+              </a:lnSpc>
+              <a:buNone/>
+            </a:pPr>
+            <a:r>
+              <a:rPr b="0" lang="lv-LV" sz="1800" spc="-1" strike="noStrike">
+                <a:latin typeface="Arial"/>
+              </a:rPr>
+              <a:t>• </a:t>
+            </a:r>
+            <a:r>
+              <a:rPr b="0" lang="lv-LV" sz="1800" spc="-1" strike="noStrike">
+                <a:latin typeface="Arial"/>
+              </a:rPr>
+              <a:t>Terraform/ansible rezultātā tiek uzstādītas 3 instances – 2Cassandra node un 1Apache node</a:t>
+            </a:r>
+            <a:endParaRPr b="0" lang="lv-LV" sz="1800" spc="-1" strike="noStrike">
+              <a:latin typeface="Arial"/>
+            </a:endParaRPr>
+          </a:p>
+          <a:p>
+            <a:pPr>
+              <a:lnSpc>
+                <a:spcPct val="100000"/>
+              </a:lnSpc>
+              <a:buNone/>
+            </a:pPr>
+            <a:r>
+              <a:rPr b="0" lang="lv-LV" sz="1800" spc="-1" strike="noStrike">
+                <a:latin typeface="Arial"/>
+              </a:rPr>
+              <a:t>• </a:t>
+            </a:r>
+            <a:r>
+              <a:rPr b="0" lang="lv-LV" sz="1800" spc="-1" strike="noStrike">
+                <a:latin typeface="Arial"/>
+              </a:rPr>
+              <a:t>Ansible uzstāda Apache server, Cassadra un tās dependencies un ielādē datus no atvērtiem datiem</a:t>
+            </a:r>
+            <a:endParaRPr b="0" lang="lv-LV" sz="1800" spc="-1" strike="noStrike">
+              <a:latin typeface="Arial"/>
+            </a:endParaRPr>
+          </a:p>
+          <a:p>
+            <a:pPr>
+              <a:lnSpc>
+                <a:spcPct val="100000"/>
+              </a:lnSpc>
+              <a:buNone/>
+            </a:pPr>
+            <a:endParaRPr b="0" lang="lv-LV" sz="1800" spc="-1" strike="noStrike">
+              <a:latin typeface="Arial"/>
+            </a:endParaRPr>
+          </a:p>
+        </p:txBody>
+      </p:sp>
+    </p:spTree>
+  </p:cSld>
+  <mc:AlternateContent>
+    <mc:Choice Requires="p14">
+      <p:transition spd="slow" p14:dur="2000"/>
+    </mc:Choice>
+    <mc:Fallback>
+      <p:transition spd="slow"/>
+    </mc:Fallback>
+  </mc:AlternateContent>
+</p:sld>
+</file>
+
+<file path=ppt/slides/slide22.xml><?xml version="1.0" encoding="utf-8"?>
+<p:sld xmlns:a="http://schemas.openxmlformats.org/drawingml/2006/main" xmlns:p="http://schemas.openxmlformats.org/presentationml/2006/main" xmlns:r="http://schemas.openxmlformats.org/officeDocument/2006/relationships" xmlns:p14="http://schemas.microsoft.com/office/powerpoint/2010/main" xmlns:p15="http://schemas.microsoft.com/office/powerpoint/2012/main" xmlns:mc="http://schemas.openxmlformats.org/markup-compatibility/2006">
+  <p:cSld>
+    <p:spTree>
+      <p:nvGrpSpPr>
+        <p:cNvPr id="1" name=""/>
+        <p:cNvGrpSpPr/>
+        <p:nvPr/>
+      </p:nvGrpSpPr>
+      <p:grpSpPr>
+        <a:xfrm>
+          <a:off x="0" y="0"/>
+          <a:ext cx="0" cy="0"/>
+          <a:chOff x="0" y="0"/>
+          <a:chExt cx="0" cy="0"/>
+        </a:xfrm>
+      </p:grpSpPr>
+      <p:sp>
+        <p:nvSpPr>
+          <p:cNvPr id="311" name="PlaceHolder 1"/>
+          <p:cNvSpPr>
+            <a:spLocks noGrp="1"/>
+          </p:cNvSpPr>
+          <p:nvPr>
+            <p:ph type="title"/>
+          </p:nvPr>
+        </p:nvSpPr>
+        <p:spPr>
+          <a:xfrm>
+            <a:off x="457200" y="4960080"/>
+            <a:ext cx="7770960" cy="1461600"/>
+          </a:xfrm>
+          <a:prstGeom prst="rect">
+            <a:avLst/>
+          </a:prstGeom>
+          <a:noFill/>
+          <a:ln w="0">
+            <a:noFill/>
+          </a:ln>
+        </p:spPr>
+        <p:txBody>
+          <a:bodyPr lIns="90000" rIns="90000" tIns="45000" bIns="45000" anchor="ctr">
+            <a:noAutofit/>
+          </a:bodyPr>
+          <a:p>
+            <a:pPr algn="r">
+              <a:lnSpc>
+                <a:spcPct val="80000"/>
+              </a:lnSpc>
+              <a:buNone/>
+            </a:pPr>
+            <a:r>
+              <a:rPr b="0" lang="lv-LV" sz="5000" spc="191" strike="noStrike" cap="all">
+                <a:solidFill>
+                  <a:srgbClr val="0d0d0d"/>
+                </a:solidFill>
+                <a:latin typeface="Tw Cen MT Condensed"/>
+              </a:rPr>
+              <a:t>Paldies par uzmanību!</a:t>
+            </a:r>
+            <a:endParaRPr b="0" lang="lv-LV" sz="5000" spc="-1" strike="noStrike">
+              <a:latin typeface="Arial"/>
+            </a:endParaRPr>
+          </a:p>
+        </p:txBody>
+      </p:sp>
+      <p:sp>
+        <p:nvSpPr>
+          <p:cNvPr id="312" name="PlaceHolder 2"/>
+          <p:cNvSpPr>
+            <a:spLocks noGrp="1"/>
+          </p:cNvSpPr>
+          <p:nvPr>
+            <p:ph/>
+          </p:nvPr>
+        </p:nvSpPr>
+        <p:spPr>
+          <a:xfrm>
+            <a:off x="8610480" y="4960080"/>
+            <a:ext cx="3198960" cy="1461600"/>
+          </a:xfrm>
+          <a:prstGeom prst="rect">
+            <a:avLst/>
+          </a:prstGeom>
+          <a:noFill/>
+          <a:ln w="0">
+            <a:noFill/>
+          </a:ln>
+        </p:spPr>
+        <p:txBody>
+          <a:bodyPr lIns="90000" rIns="90000" tIns="45000" bIns="45000" anchor="ctr">
+            <a:noAutofit/>
+          </a:bodyPr>
+          <a:p>
+            <a:endParaRPr b="0" lang="lv-LV" sz="3200" spc="-1" strike="noStrike">
               <a:latin typeface="Arial"/>
             </a:endParaRPr>
           </a:p>
@@ -30771,7 +33086,7 @@
         <p:spPr>
           <a:xfrm>
             <a:off x="1818720" y="147240"/>
-            <a:ext cx="8553960" cy="6562800"/>
+            <a:ext cx="8553240" cy="6562080"/>
           </a:xfrm>
           <a:prstGeom prst="rect">
             <a:avLst/>
@@ -30824,7 +33139,7 @@
         <p:spPr>
           <a:xfrm>
             <a:off x="1024200" y="585360"/>
-            <a:ext cx="9719280" cy="1499040"/>
+            <a:ext cx="9718560" cy="1498320"/>
           </a:xfrm>
           <a:prstGeom prst="rect">
             <a:avLst/>
@@ -30846,7 +33161,7 @@
               <a:buNone/>
             </a:pPr>
             <a:r>
-              <a:rPr b="0" lang="lv-LV" sz="5000" spc="94" strike="noStrike" cap="all">
+              <a:rPr b="0" lang="lv-LV" sz="5000" spc="89" strike="noStrike" cap="all">
                 <a:solidFill>
                   <a:srgbClr val="0d0d0d"/>
                 </a:solidFill>
@@ -30873,7 +33188,7 @@
         <p:spPr>
           <a:xfrm>
             <a:off x="6572880" y="1826640"/>
-            <a:ext cx="4754160" cy="4022640"/>
+            <a:ext cx="4753440" cy="4021920"/>
           </a:xfrm>
           <a:prstGeom prst="rect">
             <a:avLst/>
@@ -31099,7 +33414,7 @@
         <p:spPr>
           <a:xfrm>
             <a:off x="1024200" y="1826640"/>
-            <a:ext cx="4754160" cy="4022640"/>
+            <a:ext cx="4753440" cy="4021920"/>
           </a:xfrm>
           <a:prstGeom prst="rect">
             <a:avLst/>
@@ -31325,7 +33640,7 @@
         <p:spPr>
           <a:xfrm>
             <a:off x="1104840" y="5901480"/>
-            <a:ext cx="2634840" cy="630720"/>
+            <a:ext cx="2634120" cy="630000"/>
           </a:xfrm>
           <a:prstGeom prst="rect">
             <a:avLst/>
@@ -31349,7 +33664,7 @@
         <p:spPr>
           <a:xfrm>
             <a:off x="3774960" y="5850720"/>
-            <a:ext cx="2400480" cy="955800"/>
+            <a:ext cx="2399760" cy="955080"/>
           </a:xfrm>
           <a:prstGeom prst="rect">
             <a:avLst/>
@@ -31402,7 +33717,7 @@
         <p:spPr>
           <a:xfrm>
             <a:off x="1024200" y="585360"/>
-            <a:ext cx="9719280" cy="1499040"/>
+            <a:ext cx="9718560" cy="1498320"/>
           </a:xfrm>
           <a:prstGeom prst="rect">
             <a:avLst/>
@@ -31424,7 +33739,7 @@
               <a:buNone/>
             </a:pPr>
             <a:r>
-              <a:rPr b="0" lang="lv-LV" sz="5000" spc="94" strike="noStrike" cap="all">
+              <a:rPr b="0" lang="lv-LV" sz="5000" spc="89" strike="noStrike" cap="all">
                 <a:solidFill>
                   <a:srgbClr val="0d0d0d"/>
                 </a:solidFill>
@@ -31451,7 +33766,7 @@
         <p:spPr>
           <a:xfrm>
             <a:off x="1024200" y="2084760"/>
-            <a:ext cx="5180760" cy="4187160"/>
+            <a:ext cx="5180040" cy="4186440"/>
           </a:xfrm>
           <a:prstGeom prst="rect">
             <a:avLst/>
@@ -31639,7 +33954,7 @@
                 </a:solidFill>
                 <a:latin typeface="Tw Cen MT"/>
               </a:rPr>
-              <a:t>MWARE, VM ar Oracle Linux 8 (Mēģinājums izveidot terraform un aws darbināšanai Linux vidē)</a:t>
+              <a:t>VMWARE, VM ar Oracle Linux 8 (Mēģinājums izveidot terraform un aws darbināšanai Linux vidē)</a:t>
             </a:r>
             <a:endParaRPr b="0" lang="lv-LV" sz="2000" spc="-1" strike="noStrike">
               <a:latin typeface="Arial"/>
@@ -31773,14 +34088,14 @@
       </p:sp>
       <p:sp>
         <p:nvSpPr>
-          <p:cNvPr id="259" name="Content Placeholder 2"/>
+          <p:cNvPr id="259" name="PlaceHolder 4"/>
           <p:cNvSpPr/>
           <p:nvPr/>
         </p:nvSpPr>
         <p:spPr>
           <a:xfrm>
-            <a:off x="6205680" y="2084760"/>
-            <a:ext cx="5180760" cy="2129760"/>
+            <a:off x="6339600" y="2113200"/>
+            <a:ext cx="5180040" cy="4186440"/>
           </a:xfrm>
           <a:prstGeom prst="rect">
             <a:avLst/>
@@ -31797,11 +34112,11 @@
           <a:fontRef idx="minor"/>
         </p:style>
         <p:txBody>
-          <a:bodyPr lIns="90000" rIns="90000" tIns="45000" bIns="45000" anchor="t">
-            <a:normAutofit fontScale="67000"/>
+          <a:bodyPr lIns="45720" rIns="45720" tIns="0" bIns="0" anchor="t">
+            <a:normAutofit fontScale="74000"/>
           </a:bodyPr>
           <a:p>
-            <a:pPr marL="91440" indent="-91440">
+            <a:pPr>
               <a:lnSpc>
                 <a:spcPct val="90000"/>
               </a:lnSpc>
@@ -31811,11 +34126,33 @@
               <a:spcAft>
                 <a:spcPts val="201"/>
               </a:spcAft>
-              <a:buClr>
-                <a:srgbClr val="1cade4"/>
-              </a:buClr>
-              <a:buFont typeface="Tw Cen MT"/>
-              <a:buChar char=" "/>
+              <a:buNone/>
+            </a:pPr>
+            <a:r>
+              <a:rPr b="0" lang="lv-LV" sz="3200" spc="-1" strike="noStrike">
+                <a:solidFill>
+                  <a:srgbClr val="000000"/>
+                </a:solidFill>
+                <a:latin typeface="Tw Cen MT"/>
+              </a:rPr>
+              <a:t>Rolanda izstrādes un testa vide</a:t>
+            </a:r>
+            <a:endParaRPr b="0" lang="lv-LV" sz="3200" spc="-1" strike="noStrike">
+              <a:latin typeface="Arial"/>
+            </a:endParaRPr>
+          </a:p>
+          <a:p>
+            <a:pPr>
+              <a:lnSpc>
+                <a:spcPct val="90000"/>
+              </a:lnSpc>
+              <a:spcBef>
+                <a:spcPts val="1199"/>
+              </a:spcBef>
+              <a:spcAft>
+                <a:spcPts val="201"/>
+              </a:spcAft>
+              <a:buNone/>
             </a:pPr>
             <a:r>
               <a:rPr b="0" lang="lv-LV" sz="2400" spc="-1" strike="noStrike">
@@ -31823,228 +34160,19 @@
                   <a:srgbClr val="000000"/>
                 </a:solidFill>
                 <a:latin typeface="Tw Cen MT"/>
-                <a:ea typeface="DejaVu Sans"/>
               </a:rPr>
-              <a:t>Rolanda izstrādes un testa vide</a:t>
+              <a:t>• </a:t>
             </a:r>
-            <a:endParaRPr b="0" lang="lv-LV" sz="2400" spc="-1" strike="noStrike">
-              <a:latin typeface="Arial"/>
-            </a:endParaRPr>
-          </a:p>
-          <a:p>
-            <a:pPr lvl="1" marL="265320" indent="-137160">
-              <a:lnSpc>
-                <a:spcPct val="90000"/>
-              </a:lnSpc>
-              <a:spcBef>
-                <a:spcPts val="201"/>
-              </a:spcBef>
-              <a:spcAft>
-                <a:spcPts val="400"/>
-              </a:spcAft>
-              <a:buClr>
-                <a:srgbClr val="1cade4"/>
-              </a:buClr>
-              <a:buFont typeface="Wingdings 3" charset="2"/>
-              <a:buChar char=""/>
-            </a:pPr>
             <a:r>
-              <a:rPr b="0" lang="lv-LV" sz="2000" spc="-1" strike="noStrike">
+              <a:rPr b="0" lang="lv-LV" sz="2400" spc="-1" strike="noStrike">
                 <a:solidFill>
                   <a:srgbClr val="000000"/>
                 </a:solidFill>
                 <a:latin typeface="Tw Cen MT"/>
-                <a:ea typeface="DejaVu Sans"/>
               </a:rPr>
               <a:t>Windows 11</a:t>
             </a:r>
-            <a:endParaRPr b="0" lang="lv-LV" sz="2000" spc="-1" strike="noStrike">
-              <a:latin typeface="Arial"/>
-            </a:endParaRPr>
-          </a:p>
-          <a:p>
-            <a:pPr lvl="1" marL="265320" indent="-137160">
-              <a:lnSpc>
-                <a:spcPct val="90000"/>
-              </a:lnSpc>
-              <a:spcBef>
-                <a:spcPts val="201"/>
-              </a:spcBef>
-              <a:spcAft>
-                <a:spcPts val="400"/>
-              </a:spcAft>
-              <a:buClr>
-                <a:srgbClr val="1cade4"/>
-              </a:buClr>
-              <a:buFont typeface="Wingdings 3" charset="2"/>
-              <a:buChar char=""/>
-            </a:pPr>
-            <a:r>
-              <a:rPr b="0" lang="lv-LV" sz="2000" spc="-1" strike="noStrike">
-                <a:solidFill>
-                  <a:srgbClr val="000000"/>
-                </a:solidFill>
-                <a:latin typeface="Tw Cen MT"/>
-                <a:ea typeface="DejaVu Sans"/>
-              </a:rPr>
-              <a:t>Ubuntu 22.04/18.04 LTS</a:t>
-            </a:r>
-            <a:endParaRPr b="0" lang="lv-LV" sz="2000" spc="-1" strike="noStrike">
-              <a:latin typeface="Arial"/>
-            </a:endParaRPr>
-          </a:p>
-          <a:p>
-            <a:pPr lvl="1" marL="265320" indent="-137160">
-              <a:lnSpc>
-                <a:spcPct val="90000"/>
-              </a:lnSpc>
-              <a:spcBef>
-                <a:spcPts val="201"/>
-              </a:spcBef>
-              <a:spcAft>
-                <a:spcPts val="400"/>
-              </a:spcAft>
-              <a:buClr>
-                <a:srgbClr val="1cade4"/>
-              </a:buClr>
-              <a:buFont typeface="Wingdings 3" charset="2"/>
-              <a:buChar char=""/>
-            </a:pPr>
-            <a:r>
-              <a:rPr b="0" lang="lv-LV" sz="2000" spc="-1" strike="noStrike">
-                <a:solidFill>
-                  <a:srgbClr val="000000"/>
-                </a:solidFill>
-                <a:latin typeface="Tw Cen MT"/>
-                <a:ea typeface="DejaVu Sans"/>
-              </a:rPr>
-              <a:t>Visual Studio Code – terraform un ansible izstrāde ar tam paredzētajiem paplašinājumiem</a:t>
-            </a:r>
-            <a:endParaRPr b="0" lang="lv-LV" sz="2000" spc="-1" strike="noStrike">
-              <a:latin typeface="Arial"/>
-            </a:endParaRPr>
-          </a:p>
-          <a:p>
-            <a:pPr lvl="1" marL="265320" indent="-137160">
-              <a:lnSpc>
-                <a:spcPct val="90000"/>
-              </a:lnSpc>
-              <a:spcBef>
-                <a:spcPts val="201"/>
-              </a:spcBef>
-              <a:spcAft>
-                <a:spcPts val="400"/>
-              </a:spcAft>
-              <a:buClr>
-                <a:srgbClr val="1cade4"/>
-              </a:buClr>
-              <a:buFont typeface="Wingdings 3" charset="2"/>
-              <a:buChar char=""/>
-            </a:pPr>
-            <a:r>
-              <a:rPr b="0" lang="lv-LV" sz="2000" spc="-1" strike="noStrike">
-                <a:solidFill>
-                  <a:srgbClr val="000000"/>
-                </a:solidFill>
-                <a:latin typeface="Tw Cen MT"/>
-                <a:ea typeface="DejaVu Sans"/>
-              </a:rPr>
-              <a:t>Windows Terminal</a:t>
-            </a:r>
-            <a:endParaRPr b="0" lang="lv-LV" sz="2000" spc="-1" strike="noStrike">
-              <a:latin typeface="Arial"/>
-            </a:endParaRPr>
-          </a:p>
-          <a:p>
-            <a:pPr lvl="1" marL="265320" indent="-137160">
-              <a:lnSpc>
-                <a:spcPct val="90000"/>
-              </a:lnSpc>
-              <a:spcBef>
-                <a:spcPts val="201"/>
-              </a:spcBef>
-              <a:spcAft>
-                <a:spcPts val="400"/>
-              </a:spcAft>
-              <a:buClr>
-                <a:srgbClr val="1cade4"/>
-              </a:buClr>
-              <a:buFont typeface="Wingdings 3" charset="2"/>
-              <a:buChar char=""/>
-            </a:pPr>
-            <a:r>
-              <a:rPr b="0" lang="lv-LV" sz="2000" spc="-1" strike="noStrike">
-                <a:solidFill>
-                  <a:srgbClr val="000000"/>
-                </a:solidFill>
-                <a:latin typeface="Tw Cen MT"/>
-                <a:ea typeface="DejaVu Sans"/>
-              </a:rPr>
-              <a:t>Github Desktop</a:t>
-            </a:r>
-            <a:endParaRPr b="0" lang="lv-LV" sz="2000" spc="-1" strike="noStrike">
-              <a:latin typeface="Arial"/>
-            </a:endParaRPr>
-          </a:p>
-          <a:p>
-            <a:pPr lvl="1" marL="265320" indent="-137160">
-              <a:lnSpc>
-                <a:spcPct val="90000"/>
-              </a:lnSpc>
-              <a:spcBef>
-                <a:spcPts val="201"/>
-              </a:spcBef>
-              <a:spcAft>
-                <a:spcPts val="400"/>
-              </a:spcAft>
-              <a:buClr>
-                <a:srgbClr val="1cade4"/>
-              </a:buClr>
-              <a:buFont typeface="Wingdings 3" charset="2"/>
-              <a:buChar char=""/>
-            </a:pPr>
-            <a:r>
-              <a:rPr b="0" lang="lv-LV" sz="2000" spc="-1" strike="noStrike">
-                <a:solidFill>
-                  <a:srgbClr val="000000"/>
-                </a:solidFill>
-                <a:latin typeface="Tw Cen MT"/>
-                <a:ea typeface="DejaVu Sans"/>
-              </a:rPr>
-              <a:t>Git bash / GUI</a:t>
-            </a:r>
-            <a:endParaRPr b="0" lang="lv-LV" sz="2000" spc="-1" strike="noStrike">
-              <a:latin typeface="Arial"/>
-            </a:endParaRPr>
-          </a:p>
-          <a:p>
-            <a:pPr lvl="1" marL="265320" indent="-137160">
-              <a:lnSpc>
-                <a:spcPct val="90000"/>
-              </a:lnSpc>
-              <a:spcBef>
-                <a:spcPts val="201"/>
-              </a:spcBef>
-              <a:spcAft>
-                <a:spcPts val="400"/>
-              </a:spcAft>
-              <a:buClr>
-                <a:srgbClr val="1cade4"/>
-              </a:buClr>
-              <a:buFont typeface="Wingdings 3" charset="2"/>
-              <a:buChar char=""/>
-            </a:pPr>
-            <a:r>
-              <a:rPr b="0" lang="lv-LV" sz="2000" spc="-1" strike="noStrike">
-                <a:solidFill>
-                  <a:srgbClr val="000000"/>
-                </a:solidFill>
-                <a:latin typeface="Tw Cen MT"/>
-                <a:ea typeface="DejaVu Sans"/>
-              </a:rPr>
-              <a:t>AWS lu-vumc-devops konts</a:t>
-            </a:r>
-            <a:endParaRPr b="0" lang="lv-LV" sz="2000" spc="-1" strike="noStrike">
+            <a:endParaRPr b="0" lang="lv-LV" sz="2400" spc="-1" strike="noStrike">
               <a:latin typeface="Arial"/>
             </a:endParaRPr>
           </a:p>
@@ -32054,11 +34182,32 @@
                 <a:spcPct val="90000"/>
               </a:lnSpc>
               <a:spcBef>
-                <a:spcPts val="1001"/>
+                <a:spcPts val="1199"/>
               </a:spcBef>
+              <a:spcAft>
+                <a:spcPts val="201"/>
+              </a:spcAft>
               <a:buNone/>
             </a:pPr>
-            <a:endParaRPr b="0" lang="lv-LV" sz="2000" spc="-1" strike="noStrike">
+            <a:r>
+              <a:rPr b="0" lang="lv-LV" sz="2400" spc="-1" strike="noStrike">
+                <a:solidFill>
+                  <a:srgbClr val="000000"/>
+                </a:solidFill>
+                <a:latin typeface="Tw Cen MT"/>
+              </a:rPr>
+              <a:t>• </a:t>
+            </a:r>
+            <a:r>
+              <a:rPr b="0" lang="lv-LV" sz="2400" spc="-1" strike="noStrike">
+                <a:solidFill>
+                  <a:srgbClr val="000000"/>
+                </a:solidFill>
+                <a:latin typeface="Tw Cen MT"/>
+              </a:rPr>
+              <a:t>Ubuntu 22.04/18.04 LTS</a:t>
+            </a:r>
+            <a:endParaRPr b="0" lang="lv-LV" sz="2400" spc="-1" strike="noStrike">
               <a:latin typeface="Arial"/>
             </a:endParaRPr>
           </a:p>
@@ -32068,11 +34217,207 @@
                 <a:spcPct val="90000"/>
               </a:lnSpc>
               <a:spcBef>
-                <a:spcPts val="1001"/>
+                <a:spcPts val="1199"/>
               </a:spcBef>
+              <a:spcAft>
+                <a:spcPts val="201"/>
+              </a:spcAft>
               <a:buNone/>
             </a:pPr>
-            <a:endParaRPr b="0" lang="lv-LV" sz="2000" spc="-1" strike="noStrike">
+            <a:r>
+              <a:rPr b="0" lang="lv-LV" sz="2400" spc="-1" strike="noStrike">
+                <a:solidFill>
+                  <a:srgbClr val="000000"/>
+                </a:solidFill>
+                <a:latin typeface="Tw Cen MT"/>
+              </a:rPr>
+              <a:t>• </a:t>
+            </a:r>
+            <a:r>
+              <a:rPr b="0" lang="lv-LV" sz="2400" spc="-1" strike="noStrike">
+                <a:solidFill>
+                  <a:srgbClr val="000000"/>
+                </a:solidFill>
+                <a:latin typeface="Tw Cen MT"/>
+              </a:rPr>
+              <a:t>Visual Studio Code – terraform un ansible izstrāde ar tam paredzētajiem paplašinājumiem</a:t>
+            </a:r>
+            <a:endParaRPr b="0" lang="lv-LV" sz="2400" spc="-1" strike="noStrike">
+              <a:latin typeface="Arial"/>
+            </a:endParaRPr>
+          </a:p>
+          <a:p>
+            <a:pPr>
+              <a:lnSpc>
+                <a:spcPct val="90000"/>
+              </a:lnSpc>
+              <a:spcBef>
+                <a:spcPts val="1199"/>
+              </a:spcBef>
+              <a:spcAft>
+                <a:spcPts val="201"/>
+              </a:spcAft>
+              <a:buNone/>
+            </a:pPr>
+            <a:r>
+              <a:rPr b="0" lang="lv-LV" sz="2400" spc="-1" strike="noStrike">
+                <a:solidFill>
+                  <a:srgbClr val="000000"/>
+                </a:solidFill>
+                <a:latin typeface="Tw Cen MT"/>
+              </a:rPr>
+              <a:t>• </a:t>
+            </a:r>
+            <a:r>
+              <a:rPr b="0" lang="lv-LV" sz="2400" spc="-1" strike="noStrike">
+                <a:solidFill>
+                  <a:srgbClr val="000000"/>
+                </a:solidFill>
+                <a:latin typeface="Tw Cen MT"/>
+              </a:rPr>
+              <a:t>Visual Studio Code – remote ssh host, playbook izstrādei iekš AWS remote hostiem</a:t>
+            </a:r>
+            <a:endParaRPr b="0" lang="lv-LV" sz="2400" spc="-1" strike="noStrike">
+              <a:latin typeface="Arial"/>
+            </a:endParaRPr>
+          </a:p>
+          <a:p>
+            <a:pPr>
+              <a:lnSpc>
+                <a:spcPct val="90000"/>
+              </a:lnSpc>
+              <a:spcBef>
+                <a:spcPts val="1199"/>
+              </a:spcBef>
+              <a:spcAft>
+                <a:spcPts val="201"/>
+              </a:spcAft>
+              <a:buNone/>
+            </a:pPr>
+            <a:r>
+              <a:rPr b="0" lang="lv-LV" sz="2400" spc="-1" strike="noStrike">
+                <a:solidFill>
+                  <a:srgbClr val="000000"/>
+                </a:solidFill>
+                <a:latin typeface="Tw Cen MT"/>
+              </a:rPr>
+              <a:t>• </a:t>
+            </a:r>
+            <a:r>
+              <a:rPr b="0" lang="lv-LV" sz="2400" spc="-1" strike="noStrike">
+                <a:solidFill>
+                  <a:srgbClr val="000000"/>
+                </a:solidFill>
+                <a:latin typeface="Tw Cen MT"/>
+              </a:rPr>
+              <a:t>Windows Terminal</a:t>
+            </a:r>
+            <a:endParaRPr b="0" lang="lv-LV" sz="2400" spc="-1" strike="noStrike">
+              <a:latin typeface="Arial"/>
+            </a:endParaRPr>
+          </a:p>
+          <a:p>
+            <a:pPr>
+              <a:lnSpc>
+                <a:spcPct val="90000"/>
+              </a:lnSpc>
+              <a:spcBef>
+                <a:spcPts val="1199"/>
+              </a:spcBef>
+              <a:spcAft>
+                <a:spcPts val="201"/>
+              </a:spcAft>
+              <a:buNone/>
+            </a:pPr>
+            <a:r>
+              <a:rPr b="0" lang="lv-LV" sz="2400" spc="-1" strike="noStrike">
+                <a:solidFill>
+                  <a:srgbClr val="000000"/>
+                </a:solidFill>
+                <a:latin typeface="Tw Cen MT"/>
+              </a:rPr>
+              <a:t>• </a:t>
+            </a:r>
+            <a:r>
+              <a:rPr b="0" lang="lv-LV" sz="2400" spc="-1" strike="noStrike">
+                <a:solidFill>
+                  <a:srgbClr val="000000"/>
+                </a:solidFill>
+                <a:latin typeface="Tw Cen MT"/>
+              </a:rPr>
+              <a:t>Github Desktop</a:t>
+            </a:r>
+            <a:endParaRPr b="0" lang="lv-LV" sz="2400" spc="-1" strike="noStrike">
+              <a:latin typeface="Arial"/>
+            </a:endParaRPr>
+          </a:p>
+          <a:p>
+            <a:pPr>
+              <a:lnSpc>
+                <a:spcPct val="90000"/>
+              </a:lnSpc>
+              <a:spcBef>
+                <a:spcPts val="1199"/>
+              </a:spcBef>
+              <a:spcAft>
+                <a:spcPts val="201"/>
+              </a:spcAft>
+              <a:buNone/>
+            </a:pPr>
+            <a:r>
+              <a:rPr b="0" lang="lv-LV" sz="2400" spc="-1" strike="noStrike">
+                <a:solidFill>
+                  <a:srgbClr val="000000"/>
+                </a:solidFill>
+                <a:latin typeface="Tw Cen MT"/>
+              </a:rPr>
+              <a:t>• </a:t>
+            </a:r>
+            <a:r>
+              <a:rPr b="0" lang="lv-LV" sz="2400" spc="-1" strike="noStrike">
+                <a:solidFill>
+                  <a:srgbClr val="000000"/>
+                </a:solidFill>
+                <a:latin typeface="Tw Cen MT"/>
+              </a:rPr>
+              <a:t>Git bash / GUI</a:t>
+            </a:r>
+            <a:endParaRPr b="0" lang="lv-LV" sz="2400" spc="-1" strike="noStrike">
+              <a:latin typeface="Arial"/>
+            </a:endParaRPr>
+          </a:p>
+          <a:p>
+            <a:pPr>
+              <a:lnSpc>
+                <a:spcPct val="90000"/>
+              </a:lnSpc>
+              <a:spcBef>
+                <a:spcPts val="1199"/>
+              </a:spcBef>
+              <a:spcAft>
+                <a:spcPts val="201"/>
+              </a:spcAft>
+              <a:buNone/>
+            </a:pPr>
+            <a:r>
+              <a:rPr b="0" lang="lv-LV" sz="2400" spc="-1" strike="noStrike">
+                <a:solidFill>
+                  <a:srgbClr val="000000"/>
+                </a:solidFill>
+                <a:latin typeface="Tw Cen MT"/>
+              </a:rPr>
+              <a:t>• </a:t>
+            </a:r>
+            <a:r>
+              <a:rPr b="0" lang="lv-LV" sz="2400" spc="-1" strike="noStrike">
+                <a:solidFill>
+                  <a:srgbClr val="000000"/>
+                </a:solidFill>
+                <a:latin typeface="Tw Cen MT"/>
+              </a:rPr>
+              <a:t>AWS lu-vumc-devops konts</a:t>
+            </a:r>
+            <a:endParaRPr b="0" lang="lv-LV" sz="2400" spc="-1" strike="noStrike">
               <a:latin typeface="Arial"/>
             </a:endParaRPr>
           </a:p>
@@ -32121,7 +34466,7 @@
         <p:spPr>
           <a:xfrm>
             <a:off x="1024200" y="585360"/>
-            <a:ext cx="9719280" cy="1499040"/>
+            <a:ext cx="9718560" cy="1498320"/>
           </a:xfrm>
           <a:prstGeom prst="rect">
             <a:avLst/>
@@ -32143,7 +34488,7 @@
               <a:buNone/>
             </a:pPr>
             <a:r>
-              <a:rPr b="0" lang="lv-LV" sz="5000" spc="94" strike="noStrike" cap="all">
+              <a:rPr b="0" lang="lv-LV" sz="5000" spc="89" strike="noStrike" cap="all">
                 <a:solidFill>
                   <a:srgbClr val="0d0d0d"/>
                 </a:solidFill>
@@ -32153,7 +34498,7 @@
             </a:r>
             <a:br/>
             <a:r>
-              <a:rPr b="0" lang="lv-LV" sz="5000" spc="94" strike="noStrike" cap="all">
+              <a:rPr b="0" lang="lv-LV" sz="5000" spc="89" strike="noStrike" cap="all">
                 <a:solidFill>
                   <a:srgbClr val="0d0d0d"/>
                 </a:solidFill>
@@ -32180,7 +34525,7 @@
         <p:spPr>
           <a:xfrm>
             <a:off x="1024200" y="2286000"/>
-            <a:ext cx="9719280" cy="4022640"/>
+            <a:ext cx="9718560" cy="4021920"/>
           </a:xfrm>
           <a:prstGeom prst="rect">
             <a:avLst/>
@@ -32329,7 +34674,7 @@
         <p:spPr>
           <a:xfrm>
             <a:off x="1024200" y="585360"/>
-            <a:ext cx="9719280" cy="1499040"/>
+            <a:ext cx="9718560" cy="1498320"/>
           </a:xfrm>
           <a:prstGeom prst="rect">
             <a:avLst/>
@@ -32351,7 +34696,7 @@
               <a:buNone/>
             </a:pPr>
             <a:r>
-              <a:rPr b="0" lang="lv-LV" sz="5000" spc="94" strike="noStrike" cap="all">
+              <a:rPr b="0" lang="lv-LV" sz="5000" spc="89" strike="noStrike" cap="all">
                 <a:solidFill>
                   <a:srgbClr val="0d0d0d"/>
                 </a:solidFill>
@@ -32361,7 +34706,7 @@
             </a:r>
             <a:br/>
             <a:r>
-              <a:rPr b="0" lang="lv-LV" sz="5000" spc="94" strike="noStrike" cap="all">
+              <a:rPr b="0" lang="lv-LV" sz="5000" spc="89" strike="noStrike" cap="all">
                 <a:solidFill>
                   <a:srgbClr val="0d0d0d"/>
                 </a:solidFill>
@@ -32388,7 +34733,7 @@
         <p:spPr>
           <a:xfrm>
             <a:off x="1024200" y="2286000"/>
-            <a:ext cx="9719280" cy="4022640"/>
+            <a:ext cx="9718560" cy="4021920"/>
           </a:xfrm>
           <a:prstGeom prst="rect">
             <a:avLst/>
@@ -32589,7 +34934,7 @@
         <p:spPr>
           <a:xfrm>
             <a:off x="1024200" y="585360"/>
-            <a:ext cx="9719280" cy="1499040"/>
+            <a:ext cx="9718560" cy="1498320"/>
           </a:xfrm>
           <a:prstGeom prst="rect">
             <a:avLst/>
@@ -32611,7 +34956,7 @@
               <a:buNone/>
             </a:pPr>
             <a:r>
-              <a:rPr b="0" lang="lv-LV" sz="5000" spc="94" strike="noStrike" cap="all">
+              <a:rPr b="0" lang="lv-LV" sz="5000" spc="89" strike="noStrike" cap="all">
                 <a:solidFill>
                   <a:srgbClr val="0d0d0d"/>
                 </a:solidFill>
@@ -32621,7 +34966,7 @@
             </a:r>
             <a:br/>
             <a:r>
-              <a:rPr b="0" lang="lv-LV" sz="5000" spc="94" strike="noStrike" cap="all">
+              <a:rPr b="0" lang="lv-LV" sz="5000" spc="89" strike="noStrike" cap="all">
                 <a:solidFill>
                   <a:srgbClr val="0d0d0d"/>
                 </a:solidFill>
@@ -32648,7 +34993,7 @@
         <p:spPr>
           <a:xfrm>
             <a:off x="1024200" y="2286000"/>
-            <a:ext cx="9719280" cy="4022640"/>
+            <a:ext cx="9718560" cy="4021920"/>
           </a:xfrm>
           <a:prstGeom prst="rect">
             <a:avLst/>
@@ -32847,7 +35192,7 @@
         <p:spPr>
           <a:xfrm>
             <a:off x="1024200" y="585360"/>
-            <a:ext cx="9719280" cy="1499040"/>
+            <a:ext cx="9718560" cy="1498320"/>
           </a:xfrm>
           <a:prstGeom prst="rect">
             <a:avLst/>
@@ -32869,7 +35214,7 @@
               <a:buNone/>
             </a:pPr>
             <a:r>
-              <a:rPr b="0" lang="lv-LV" sz="5000" spc="94" strike="noStrike" cap="all">
+              <a:rPr b="0" lang="lv-LV" sz="5000" spc="89" strike="noStrike" cap="all">
                 <a:solidFill>
                   <a:srgbClr val="0d0d0d"/>
                 </a:solidFill>
@@ -32896,7 +35241,7 @@
         <p:spPr>
           <a:xfrm>
             <a:off x="91080" y="2647800"/>
-            <a:ext cx="12009600" cy="1561680"/>
+            <a:ext cx="12008880" cy="1560960"/>
           </a:xfrm>
           <a:prstGeom prst="rect">
             <a:avLst/>

</xml_diff>